<commit_message>
mise a jour pres
</commit_message>
<xml_diff>
--- a/Admimistatif/Presentation.pptx
+++ b/Admimistatif/Presentation.pptx
@@ -637,15 +637,7 @@
           <a:p>
             <a:r>
               <a:rPr lang="fr-CH" dirty="0" smtClean="0"/>
-              <a:t>Cahier </a:t>
-            </a:r>
-            <a:r>
-              <a:rPr lang="fr-CH" dirty="0" smtClean="0"/>
-              <a:t>des </a:t>
-            </a:r>
-            <a:r>
-              <a:rPr lang="fr-CH" dirty="0" smtClean="0"/>
-              <a:t>charges</a:t>
+              <a:t>Cahier des charges</a:t>
             </a:r>
             <a:endParaRPr lang="fr-CH" dirty="0"/>
           </a:p>
@@ -5857,11 +5849,7 @@
             </a:r>
             <a:r>
               <a:rPr lang="fr-CH" dirty="0" smtClean="0"/>
-              <a:t> </a:t>
-            </a:r>
-            <a:r>
-              <a:rPr lang="fr-CH" dirty="0" smtClean="0"/>
-              <a:t>2D</a:t>
+              <a:t> 2D</a:t>
             </a:r>
           </a:p>
           <a:p>
@@ -6165,6 +6153,36 @@
           </a:p>
         </p:txBody>
       </p:sp>
+      <p:pic>
+        <p:nvPicPr>
+          <p:cNvPr id="4" name="Image 3"/>
+          <p:cNvPicPr>
+            <a:picLocks noChangeAspect="1"/>
+          </p:cNvPicPr>
+          <p:nvPr/>
+        </p:nvPicPr>
+        <p:blipFill>
+          <a:blip r:embed="rId3">
+            <a:extLst>
+              <a:ext uri="{28A0092B-C50C-407E-A947-70E740481C1C}">
+                <a14:useLocalDpi xmlns:a14="http://schemas.microsoft.com/office/drawing/2010/main" val="0"/>
+              </a:ext>
+            </a:extLst>
+          </a:blip>
+          <a:stretch>
+            <a:fillRect/>
+          </a:stretch>
+        </p:blipFill>
+        <p:spPr>
+          <a:xfrm>
+            <a:off x="3995936" y="1916832"/>
+            <a:ext cx="4050793" cy="4076190"/>
+          </a:xfrm>
+          <a:prstGeom prst="rect">
+            <a:avLst/>
+          </a:prstGeom>
+        </p:spPr>
+      </p:pic>
     </p:spTree>
     <p:extLst>
       <p:ext uri="{BB962C8B-B14F-4D97-AF65-F5344CB8AC3E}">

</xml_diff>

<commit_message>
avancement de la presentation
</commit_message>
<xml_diff>
--- a/Admimistatif/Presentation.pptx
+++ b/Admimistatif/Presentation.pptx
@@ -281,35 +281,35 @@
           <a:p>
             <a:pPr lvl="0"/>
             <a:r>
-              <a:rPr lang="fr-FR" smtClean="0"/>
+              <a:rPr lang="fr-FR"/>
               <a:t>Modifiez les styles du texte du masque</a:t>
             </a:r>
           </a:p>
           <a:p>
             <a:pPr lvl="1"/>
             <a:r>
-              <a:rPr lang="fr-FR" smtClean="0"/>
+              <a:rPr lang="fr-FR"/>
               <a:t>Deuxième niveau</a:t>
             </a:r>
           </a:p>
           <a:p>
             <a:pPr lvl="2"/>
             <a:r>
-              <a:rPr lang="fr-FR" smtClean="0"/>
+              <a:rPr lang="fr-FR"/>
               <a:t>Troisième niveau</a:t>
             </a:r>
           </a:p>
           <a:p>
             <a:pPr lvl="3"/>
             <a:r>
-              <a:rPr lang="fr-FR" smtClean="0"/>
+              <a:rPr lang="fr-FR"/>
               <a:t>Quatrième niveau</a:t>
             </a:r>
           </a:p>
           <a:p>
             <a:pPr lvl="4"/>
             <a:r>
-              <a:rPr lang="fr-FR" smtClean="0"/>
+              <a:rPr lang="fr-FR"/>
               <a:t>Cinquième niveau</a:t>
             </a:r>
             <a:endParaRPr lang="fr-CH"/>
@@ -614,32 +614,31 @@
           <a:lstStyle/>
           <a:p>
             <a:r>
-              <a:rPr lang="fr-CH" dirty="0" smtClean="0"/>
+              <a:rPr lang="fr-CH" dirty="0"/>
               <a:t>Idée de base</a:t>
             </a:r>
             <a:r>
-              <a:rPr lang="fr-CH" baseline="0" dirty="0" smtClean="0"/>
+              <a:rPr lang="fr-CH" baseline="0" dirty="0"/>
               <a:t> =&gt; faire un jeu de </a:t>
             </a:r>
             <a:r>
-              <a:rPr lang="fr-CH" baseline="0" dirty="0" err="1" smtClean="0"/>
+              <a:rPr lang="fr-CH" baseline="0" dirty="0" err="1"/>
               <a:t>plateform</a:t>
             </a:r>
             <a:r>
-              <a:rPr lang="fr-CH" baseline="0" dirty="0" smtClean="0"/>
+              <a:rPr lang="fr-CH" baseline="0" dirty="0"/>
               <a:t> en 2d</a:t>
             </a:r>
-            <a:endParaRPr lang="fr-CH" dirty="0" smtClean="0"/>
-          </a:p>
-          <a:p>
-            <a:endParaRPr lang="fr-CH" dirty="0" smtClean="0"/>
-          </a:p>
-          <a:p>
-            <a:r>
-              <a:rPr lang="fr-CH" dirty="0" smtClean="0"/>
+            <a:endParaRPr lang="fr-CH" dirty="0"/>
+          </a:p>
+          <a:p>
+            <a:endParaRPr lang="fr-CH" dirty="0"/>
+          </a:p>
+          <a:p>
+            <a:r>
+              <a:rPr lang="fr-CH" dirty="0"/>
               <a:t>Cahier des charges</a:t>
             </a:r>
-            <a:endParaRPr lang="fr-CH" dirty="0"/>
           </a:p>
           <a:p>
             <a:pPr marL="171450" indent="-171450">
@@ -647,15 +646,15 @@
               <a:buChar char="-"/>
             </a:pPr>
             <a:r>
-              <a:rPr lang="fr-CH" baseline="0" dirty="0" smtClean="0"/>
+              <a:rPr lang="fr-CH" baseline="0" dirty="0"/>
               <a:t>Utilisation de </a:t>
             </a:r>
             <a:r>
-              <a:rPr lang="fr-CH" baseline="0" dirty="0" err="1" smtClean="0"/>
+              <a:rPr lang="fr-CH" baseline="0" dirty="0" err="1"/>
               <a:t>tiled</a:t>
             </a:r>
             <a:r>
-              <a:rPr lang="fr-CH" baseline="0" dirty="0" smtClean="0"/>
+              <a:rPr lang="fr-CH" baseline="0" dirty="0"/>
               <a:t> pour les niveaux</a:t>
             </a:r>
           </a:p>
@@ -665,11 +664,11 @@
               <a:buChar char="-"/>
             </a:pPr>
             <a:r>
-              <a:rPr lang="fr-CH" baseline="0" dirty="0" err="1" smtClean="0"/>
+              <a:rPr lang="fr-CH" baseline="0" dirty="0" err="1"/>
               <a:t>Deplacement</a:t>
             </a:r>
             <a:r>
-              <a:rPr lang="fr-CH" baseline="0" dirty="0" smtClean="0"/>
+              <a:rPr lang="fr-CH" baseline="0" dirty="0"/>
               <a:t> du personnage</a:t>
             </a:r>
           </a:p>
@@ -679,7 +678,7 @@
               <a:buChar char="-"/>
             </a:pPr>
             <a:r>
-              <a:rPr lang="fr-CH" baseline="0" dirty="0" smtClean="0"/>
+              <a:rPr lang="fr-CH" baseline="0" dirty="0"/>
               <a:t>Collisions</a:t>
             </a:r>
           </a:p>
@@ -689,7 +688,7 @@
               <a:buChar char="-"/>
             </a:pPr>
             <a:r>
-              <a:rPr lang="fr-CH" baseline="0" dirty="0" smtClean="0"/>
+              <a:rPr lang="fr-CH" baseline="0" dirty="0"/>
               <a:t>Physique du jeu (gravité)</a:t>
             </a:r>
           </a:p>
@@ -699,7 +698,7 @@
               <a:buChar char="-"/>
             </a:pPr>
             <a:r>
-              <a:rPr lang="fr-CH" baseline="0" dirty="0" smtClean="0"/>
+              <a:rPr lang="fr-CH" baseline="0" dirty="0"/>
               <a:t>Background avec scrolling</a:t>
             </a:r>
           </a:p>
@@ -709,7 +708,7 @@
               <a:buChar char="-"/>
             </a:pPr>
             <a:r>
-              <a:rPr lang="fr-CH" baseline="0" dirty="0" smtClean="0"/>
+              <a:rPr lang="fr-CH" baseline="0" dirty="0"/>
               <a:t>HUD de base</a:t>
             </a:r>
           </a:p>
@@ -719,7 +718,7 @@
               <a:buChar char="-"/>
             </a:pPr>
             <a:r>
-              <a:rPr lang="fr-CH" baseline="0" dirty="0" smtClean="0"/>
+              <a:rPr lang="fr-CH" baseline="0" dirty="0"/>
               <a:t>Animations</a:t>
             </a:r>
           </a:p>
@@ -728,14 +727,14 @@
               <a:buFontTx/>
               <a:buChar char="-"/>
             </a:pPr>
-            <a:endParaRPr lang="fr-CH" baseline="0" dirty="0" smtClean="0"/>
+            <a:endParaRPr lang="fr-CH" baseline="0" dirty="0"/>
           </a:p>
           <a:p>
             <a:pPr marL="171450" indent="-171450">
               <a:buFontTx/>
               <a:buChar char="-"/>
             </a:pPr>
-            <a:endParaRPr lang="fr-CH" dirty="0" smtClean="0"/>
+            <a:endParaRPr lang="fr-CH" dirty="0"/>
           </a:p>
         </p:txBody>
       </p:sp>
@@ -820,49 +819,49 @@
           <a:lstStyle/>
           <a:p>
             <a:r>
-              <a:rPr lang="fr-CH" dirty="0" smtClean="0"/>
+              <a:rPr lang="fr-CH" dirty="0"/>
               <a:t> </a:t>
             </a:r>
             <a:r>
-              <a:rPr lang="fr-CH" dirty="0" err="1" smtClean="0"/>
+              <a:rPr lang="fr-CH" dirty="0" err="1"/>
               <a:t>gameStage</a:t>
             </a:r>
             <a:r>
-              <a:rPr lang="fr-CH" dirty="0" smtClean="0"/>
+              <a:rPr lang="fr-CH" dirty="0"/>
               <a:t> (</a:t>
             </a:r>
             <a:r>
-              <a:rPr lang="fr-CH" dirty="0" err="1" smtClean="0"/>
+              <a:rPr lang="fr-CH" dirty="0" err="1"/>
               <a:t>scene</a:t>
             </a:r>
             <a:r>
-              <a:rPr lang="fr-CH" dirty="0" smtClean="0"/>
+              <a:rPr lang="fr-CH" dirty="0"/>
               <a:t>)</a:t>
             </a:r>
             <a:r>
-              <a:rPr lang="fr-CH" baseline="0" dirty="0" smtClean="0"/>
+              <a:rPr lang="fr-CH" baseline="0" dirty="0"/>
               <a:t> contient les </a:t>
             </a:r>
             <a:r>
-              <a:rPr lang="fr-CH" baseline="0" dirty="0" err="1" smtClean="0"/>
+              <a:rPr lang="fr-CH" baseline="0" dirty="0" err="1"/>
               <a:t>elements</a:t>
             </a:r>
             <a:r>
-              <a:rPr lang="fr-CH" baseline="0" dirty="0" smtClean="0"/>
+              <a:rPr lang="fr-CH" baseline="0" dirty="0"/>
               <a:t> de jeu.</a:t>
             </a:r>
           </a:p>
           <a:p>
             <a:r>
-              <a:rPr lang="fr-CH" baseline="0" dirty="0" smtClean="0"/>
+              <a:rPr lang="fr-CH" baseline="0" dirty="0"/>
               <a:t>Deux boucles, une pour les calculs (position </a:t>
             </a:r>
             <a:r>
-              <a:rPr lang="fr-CH" baseline="0" dirty="0" err="1" smtClean="0"/>
+              <a:rPr lang="fr-CH" baseline="0" dirty="0" err="1"/>
               <a:t>etc</a:t>
             </a:r>
             <a:r>
-              <a:rPr lang="fr-CH" baseline="0" dirty="0" smtClean="0"/>
+              <a:rPr lang="fr-CH" baseline="0" dirty="0"/>
               <a:t>) et une pour le rendu (graphique…)</a:t>
             </a:r>
             <a:endParaRPr lang="fr-CH" dirty="0"/>
@@ -950,19 +949,19 @@
           <a:lstStyle/>
           <a:p>
             <a:r>
-              <a:rPr lang="fr-CH" dirty="0" err="1" smtClean="0"/>
+              <a:rPr lang="fr-CH" dirty="0" err="1"/>
               <a:t>Ghosts</a:t>
             </a:r>
             <a:r>
-              <a:rPr lang="fr-CH" dirty="0" smtClean="0"/>
+              <a:rPr lang="fr-CH" dirty="0"/>
               <a:t> </a:t>
             </a:r>
             <a:r>
-              <a:rPr lang="fr-CH" dirty="0" err="1" smtClean="0"/>
+              <a:rPr lang="fr-CH" dirty="0" err="1"/>
               <a:t>vertices</a:t>
             </a:r>
             <a:r>
-              <a:rPr lang="fr-CH" dirty="0" smtClean="0"/>
+              <a:rPr lang="fr-CH" dirty="0"/>
               <a:t>?</a:t>
             </a:r>
           </a:p>
@@ -1354,7 +1353,7 @@
             <a:lstStyle/>
             <a:p>
               <a:r>
-                <a:rPr lang="en-US" sz="5400" dirty="0" smtClean="0">
+                <a:rPr lang="en-US" sz="5400" dirty="0">
                   <a:ln w="3175">
                     <a:solidFill>
                       <a:schemeClr val="tx2">
@@ -1378,28 +1377,6 @@
                 </a:rPr>
                 <a:t></a:t>
               </a:r>
-              <a:endParaRPr lang="en-US" sz="5400" dirty="0">
-                <a:ln w="3175">
-                  <a:solidFill>
-                    <a:schemeClr val="tx2">
-                      <a:alpha val="60000"/>
-                    </a:schemeClr>
-                  </a:solidFill>
-                </a:ln>
-                <a:solidFill>
-                  <a:schemeClr val="tx2">
-                    <a:lumMod val="90000"/>
-                  </a:schemeClr>
-                </a:solidFill>
-                <a:effectLst>
-                  <a:outerShdw blurRad="34925" dist="12700" dir="14400000" algn="ctr" rotWithShape="0">
-                    <a:srgbClr val="000000">
-                      <a:alpha val="21000"/>
-                    </a:srgbClr>
-                  </a:outerShdw>
-                </a:effectLst>
-                <a:latin typeface="Wingdings" pitchFamily="2" charset="2"/>
-              </a:endParaRPr>
             </a:p>
           </p:txBody>
         </p:sp>
@@ -1523,7 +1500,7 @@
           </a:lstStyle>
           <a:p>
             <a:r>
-              <a:rPr lang="fr-FR" smtClean="0"/>
+              <a:rPr lang="fr-FR"/>
               <a:t>Modifiez le style du titre</a:t>
             </a:r>
             <a:endParaRPr lang="en-US" dirty="0"/>
@@ -1647,7 +1624,7 @@
           </a:lstStyle>
           <a:p>
             <a:r>
-              <a:rPr lang="fr-FR" smtClean="0"/>
+              <a:rPr lang="fr-FR"/>
               <a:t>Modifiez le style des sous-titres du masque</a:t>
             </a:r>
             <a:endParaRPr lang="en-US" dirty="0"/>
@@ -1695,7 +1672,7 @@
           <a:lstStyle/>
           <a:p>
             <a:r>
-              <a:rPr lang="fr-FR" smtClean="0"/>
+              <a:rPr lang="fr-FR"/>
               <a:t>Modifiez le style du titre</a:t>
             </a:r>
             <a:endParaRPr lang="en-US"/>
@@ -1719,35 +1696,35 @@
           <a:p>
             <a:pPr lvl="0"/>
             <a:r>
-              <a:rPr lang="fr-FR" smtClean="0"/>
+              <a:rPr lang="fr-FR"/>
               <a:t>Modifiez les styles du texte du masque</a:t>
             </a:r>
           </a:p>
           <a:p>
             <a:pPr lvl="1"/>
             <a:r>
-              <a:rPr lang="fr-FR" smtClean="0"/>
+              <a:rPr lang="fr-FR"/>
               <a:t>Deuxième niveau</a:t>
             </a:r>
           </a:p>
           <a:p>
             <a:pPr lvl="2"/>
             <a:r>
-              <a:rPr lang="fr-FR" smtClean="0"/>
+              <a:rPr lang="fr-FR"/>
               <a:t>Troisième niveau</a:t>
             </a:r>
           </a:p>
           <a:p>
             <a:pPr lvl="3"/>
             <a:r>
-              <a:rPr lang="fr-FR" smtClean="0"/>
+              <a:rPr lang="fr-FR"/>
               <a:t>Quatrième niveau</a:t>
             </a:r>
           </a:p>
           <a:p>
             <a:pPr lvl="4"/>
             <a:r>
-              <a:rPr lang="fr-FR" smtClean="0"/>
+              <a:rPr lang="fr-FR"/>
               <a:t>Cinquième niveau</a:t>
             </a:r>
             <a:endParaRPr lang="en-US"/>
@@ -1856,7 +1833,7 @@
             <a:lstStyle/>
             <a:p>
               <a:r>
-                <a:rPr lang="en-US" sz="5400" dirty="0" smtClean="0">
+                <a:rPr lang="en-US" sz="5400" dirty="0">
                   <a:solidFill>
                     <a:schemeClr val="tx2">
                       <a:lumMod val="60000"/>
@@ -1867,15 +1844,6 @@
                 </a:rPr>
                 <a:t></a:t>
               </a:r>
-              <a:endParaRPr lang="en-US" sz="5400" dirty="0">
-                <a:solidFill>
-                  <a:schemeClr val="tx2">
-                    <a:lumMod val="60000"/>
-                    <a:lumOff val="40000"/>
-                  </a:schemeClr>
-                </a:solidFill>
-                <a:latin typeface="Wingdings" pitchFamily="2" charset="2"/>
-              </a:endParaRPr>
             </a:p>
           </p:txBody>
         </p:sp>
@@ -2004,7 +1972,7 @@
           <a:lstStyle/>
           <a:p>
             <a:r>
-              <a:rPr lang="fr-FR" smtClean="0"/>
+              <a:rPr lang="fr-FR"/>
               <a:t>Modifiez le style du titre</a:t>
             </a:r>
             <a:endParaRPr lang="en-US" dirty="0"/>
@@ -2033,35 +2001,35 @@
           <a:p>
             <a:pPr lvl="0"/>
             <a:r>
-              <a:rPr lang="fr-FR" smtClean="0"/>
+              <a:rPr lang="fr-FR"/>
               <a:t>Modifiez les styles du texte du masque</a:t>
             </a:r>
           </a:p>
           <a:p>
             <a:pPr lvl="1"/>
             <a:r>
-              <a:rPr lang="fr-FR" smtClean="0"/>
+              <a:rPr lang="fr-FR"/>
               <a:t>Deuxième niveau</a:t>
             </a:r>
           </a:p>
           <a:p>
             <a:pPr lvl="2"/>
             <a:r>
-              <a:rPr lang="fr-FR" smtClean="0"/>
+              <a:rPr lang="fr-FR"/>
               <a:t>Troisième niveau</a:t>
             </a:r>
           </a:p>
           <a:p>
             <a:pPr lvl="3"/>
             <a:r>
-              <a:rPr lang="fr-FR" smtClean="0"/>
+              <a:rPr lang="fr-FR"/>
               <a:t>Quatrième niveau</a:t>
             </a:r>
           </a:p>
           <a:p>
             <a:pPr lvl="4"/>
             <a:r>
-              <a:rPr lang="fr-FR" smtClean="0"/>
+              <a:rPr lang="fr-FR"/>
               <a:t>Cinquième niveau</a:t>
             </a:r>
             <a:endParaRPr lang="en-US"/>
@@ -2170,7 +2138,7 @@
             <a:lstStyle/>
             <a:p>
               <a:r>
-                <a:rPr lang="en-US" sz="5400" dirty="0" smtClean="0">
+                <a:rPr lang="en-US" sz="5400" dirty="0">
                   <a:solidFill>
                     <a:schemeClr val="tx2">
                       <a:lumMod val="60000"/>
@@ -2181,15 +2149,6 @@
                 </a:rPr>
                 <a:t></a:t>
               </a:r>
-              <a:endParaRPr lang="en-US" sz="5400" dirty="0">
-                <a:solidFill>
-                  <a:schemeClr val="tx2">
-                    <a:lumMod val="60000"/>
-                    <a:lumOff val="40000"/>
-                  </a:schemeClr>
-                </a:solidFill>
-                <a:latin typeface="Wingdings" pitchFamily="2" charset="2"/>
-              </a:endParaRPr>
             </a:p>
           </p:txBody>
         </p:sp>
@@ -2319,35 +2278,35 @@
           <a:p>
             <a:pPr lvl="0"/>
             <a:r>
-              <a:rPr lang="fr-FR" smtClean="0"/>
+              <a:rPr lang="fr-FR"/>
               <a:t>Modifiez les styles du texte du masque</a:t>
             </a:r>
           </a:p>
           <a:p>
             <a:pPr lvl="1"/>
             <a:r>
-              <a:rPr lang="fr-FR" smtClean="0"/>
+              <a:rPr lang="fr-FR"/>
               <a:t>Deuxième niveau</a:t>
             </a:r>
           </a:p>
           <a:p>
             <a:pPr lvl="2"/>
             <a:r>
-              <a:rPr lang="fr-FR" smtClean="0"/>
+              <a:rPr lang="fr-FR"/>
               <a:t>Troisième niveau</a:t>
             </a:r>
           </a:p>
           <a:p>
             <a:pPr lvl="3"/>
             <a:r>
-              <a:rPr lang="fr-FR" smtClean="0"/>
+              <a:rPr lang="fr-FR"/>
               <a:t>Quatrième niveau</a:t>
             </a:r>
           </a:p>
           <a:p>
             <a:pPr lvl="4"/>
             <a:r>
-              <a:rPr lang="fr-FR" smtClean="0"/>
+              <a:rPr lang="fr-FR"/>
               <a:t>Cinquième niveau</a:t>
             </a:r>
             <a:endParaRPr lang="en-US"/>
@@ -2435,7 +2394,7 @@
           <a:lstStyle/>
           <a:p>
             <a:r>
-              <a:rPr lang="fr-FR" smtClean="0"/>
+              <a:rPr lang="fr-FR"/>
               <a:t>Modifiez le style du titre</a:t>
             </a:r>
             <a:endParaRPr lang="en-US"/>
@@ -2479,7 +2438,7 @@
             <a:lstStyle/>
             <a:p>
               <a:r>
-                <a:rPr lang="en-US" sz="5400" dirty="0" smtClean="0">
+                <a:rPr lang="en-US" sz="5400" dirty="0">
                   <a:solidFill>
                     <a:schemeClr val="tx2">
                       <a:lumMod val="60000"/>
@@ -2490,15 +2449,6 @@
                 </a:rPr>
                 <a:t></a:t>
               </a:r>
-              <a:endParaRPr lang="en-US" sz="5400" dirty="0">
-                <a:solidFill>
-                  <a:schemeClr val="tx2">
-                    <a:lumMod val="60000"/>
-                    <a:lumOff val="40000"/>
-                  </a:schemeClr>
-                </a:solidFill>
-                <a:latin typeface="Wingdings" pitchFamily="2" charset="2"/>
-              </a:endParaRPr>
             </a:p>
           </p:txBody>
         </p:sp>
@@ -2674,7 +2624,7 @@
             <a:lstStyle/>
             <a:p>
               <a:r>
-                <a:rPr lang="en-US" sz="5400" dirty="0" smtClean="0">
+                <a:rPr lang="en-US" sz="5400" dirty="0">
                   <a:solidFill>
                     <a:schemeClr val="tx2">
                       <a:lumMod val="60000"/>
@@ -2685,15 +2635,6 @@
                 </a:rPr>
                 <a:t></a:t>
               </a:r>
-              <a:endParaRPr lang="en-US" sz="5400" dirty="0">
-                <a:solidFill>
-                  <a:schemeClr val="tx2">
-                    <a:lumMod val="60000"/>
-                    <a:lumOff val="40000"/>
-                  </a:schemeClr>
-                </a:solidFill>
-                <a:latin typeface="Wingdings" pitchFamily="2" charset="2"/>
-              </a:endParaRPr>
             </a:p>
           </p:txBody>
         </p:sp>
@@ -2805,7 +2746,7 @@
           </a:lstStyle>
           <a:p>
             <a:r>
-              <a:rPr lang="fr-FR" smtClean="0"/>
+              <a:rPr lang="fr-FR"/>
               <a:t>Modifiez le style du titre</a:t>
             </a:r>
             <a:endParaRPr lang="en-US" dirty="0"/>
@@ -2923,7 +2864,7 @@
           <a:p>
             <a:pPr lvl="0"/>
             <a:r>
-              <a:rPr lang="fr-FR" smtClean="0"/>
+              <a:rPr lang="fr-FR"/>
               <a:t>Modifiez les styles du texte du masque</a:t>
             </a:r>
           </a:p>
@@ -3108,7 +3049,7 @@
           </a:lstStyle>
           <a:p>
             <a:r>
-              <a:rPr lang="fr-FR" smtClean="0"/>
+              <a:rPr lang="fr-FR"/>
               <a:t>Modifiez le style du titre</a:t>
             </a:r>
             <a:endParaRPr lang="en-US" dirty="0"/>
@@ -3152,7 +3093,7 @@
             <a:lstStyle/>
             <a:p>
               <a:r>
-                <a:rPr lang="en-US" sz="5400" dirty="0" smtClean="0">
+                <a:rPr lang="en-US" sz="5400" dirty="0">
                   <a:solidFill>
                     <a:schemeClr val="tx2">
                       <a:lumMod val="60000"/>
@@ -3163,15 +3104,6 @@
                 </a:rPr>
                 <a:t></a:t>
               </a:r>
-              <a:endParaRPr lang="en-US" sz="5400" dirty="0">
-                <a:solidFill>
-                  <a:schemeClr val="tx2">
-                    <a:lumMod val="60000"/>
-                    <a:lumOff val="40000"/>
-                  </a:schemeClr>
-                </a:solidFill>
-                <a:latin typeface="Wingdings" pitchFamily="2" charset="2"/>
-              </a:endParaRPr>
             </a:p>
           </p:txBody>
         </p:sp>
@@ -3276,35 +3208,35 @@
           <a:p>
             <a:pPr lvl="0"/>
             <a:r>
-              <a:rPr lang="fr-FR" smtClean="0"/>
+              <a:rPr lang="fr-FR"/>
               <a:t>Modifiez les styles du texte du masque</a:t>
             </a:r>
           </a:p>
           <a:p>
             <a:pPr lvl="1"/>
             <a:r>
-              <a:rPr lang="fr-FR" smtClean="0"/>
+              <a:rPr lang="fr-FR"/>
               <a:t>Deuxième niveau</a:t>
             </a:r>
           </a:p>
           <a:p>
             <a:pPr lvl="2"/>
             <a:r>
-              <a:rPr lang="fr-FR" smtClean="0"/>
+              <a:rPr lang="fr-FR"/>
               <a:t>Troisième niveau</a:t>
             </a:r>
           </a:p>
           <a:p>
             <a:pPr lvl="3"/>
             <a:r>
-              <a:rPr lang="fr-FR" smtClean="0"/>
+              <a:rPr lang="fr-FR"/>
               <a:t>Quatrième niveau</a:t>
             </a:r>
           </a:p>
           <a:p>
             <a:pPr lvl="4"/>
             <a:r>
-              <a:rPr lang="fr-FR" smtClean="0"/>
+              <a:rPr lang="fr-FR"/>
               <a:t>Cinquième niveau</a:t>
             </a:r>
             <a:endParaRPr lang="en-US"/>
@@ -3333,35 +3265,35 @@
           <a:p>
             <a:pPr lvl="0"/>
             <a:r>
-              <a:rPr lang="fr-FR" smtClean="0"/>
+              <a:rPr lang="fr-FR"/>
               <a:t>Modifiez les styles du texte du masque</a:t>
             </a:r>
           </a:p>
           <a:p>
             <a:pPr lvl="1"/>
             <a:r>
-              <a:rPr lang="fr-FR" smtClean="0"/>
+              <a:rPr lang="fr-FR"/>
               <a:t>Deuxième niveau</a:t>
             </a:r>
           </a:p>
           <a:p>
             <a:pPr lvl="2"/>
             <a:r>
-              <a:rPr lang="fr-FR" smtClean="0"/>
+              <a:rPr lang="fr-FR"/>
               <a:t>Troisième niveau</a:t>
             </a:r>
           </a:p>
           <a:p>
             <a:pPr lvl="3"/>
             <a:r>
-              <a:rPr lang="fr-FR" smtClean="0"/>
+              <a:rPr lang="fr-FR"/>
               <a:t>Quatrième niveau</a:t>
             </a:r>
           </a:p>
           <a:p>
             <a:pPr lvl="4"/>
             <a:r>
-              <a:rPr lang="fr-FR" smtClean="0"/>
+              <a:rPr lang="fr-FR"/>
               <a:t>Cinquième niveau</a:t>
             </a:r>
             <a:endParaRPr lang="en-US"/>
@@ -3413,7 +3345,7 @@
           </a:lstStyle>
           <a:p>
             <a:r>
-              <a:rPr lang="fr-FR" smtClean="0"/>
+              <a:rPr lang="fr-FR"/>
               <a:t>Modifiez le style du titre</a:t>
             </a:r>
             <a:endParaRPr lang="en-US"/>
@@ -3483,7 +3415,7 @@
           <a:p>
             <a:pPr lvl="0"/>
             <a:r>
-              <a:rPr lang="fr-FR" smtClean="0"/>
+              <a:rPr lang="fr-FR"/>
               <a:t>Modifiez les styles du texte du masque</a:t>
             </a:r>
           </a:p>
@@ -3539,35 +3471,35 @@
           <a:p>
             <a:pPr lvl="0"/>
             <a:r>
-              <a:rPr lang="fr-FR" smtClean="0"/>
+              <a:rPr lang="fr-FR"/>
               <a:t>Modifiez les styles du texte du masque</a:t>
             </a:r>
           </a:p>
           <a:p>
             <a:pPr lvl="1"/>
             <a:r>
-              <a:rPr lang="fr-FR" smtClean="0"/>
+              <a:rPr lang="fr-FR"/>
               <a:t>Deuxième niveau</a:t>
             </a:r>
           </a:p>
           <a:p>
             <a:pPr lvl="2"/>
             <a:r>
-              <a:rPr lang="fr-FR" smtClean="0"/>
+              <a:rPr lang="fr-FR"/>
               <a:t>Troisième niveau</a:t>
             </a:r>
           </a:p>
           <a:p>
             <a:pPr lvl="3"/>
             <a:r>
-              <a:rPr lang="fr-FR" smtClean="0"/>
+              <a:rPr lang="fr-FR"/>
               <a:t>Quatrième niveau</a:t>
             </a:r>
           </a:p>
           <a:p>
             <a:pPr lvl="4"/>
             <a:r>
-              <a:rPr lang="fr-FR" smtClean="0"/>
+              <a:rPr lang="fr-FR"/>
               <a:t>Cinquième niveau</a:t>
             </a:r>
             <a:endParaRPr lang="en-US" dirty="0"/>
@@ -3637,7 +3569,7 @@
           <a:p>
             <a:pPr lvl="0"/>
             <a:r>
-              <a:rPr lang="fr-FR" smtClean="0"/>
+              <a:rPr lang="fr-FR"/>
               <a:t>Modifiez les styles du texte du masque</a:t>
             </a:r>
           </a:p>
@@ -3693,35 +3625,35 @@
           <a:p>
             <a:pPr lvl="0"/>
             <a:r>
-              <a:rPr lang="fr-FR" smtClean="0"/>
+              <a:rPr lang="fr-FR"/>
               <a:t>Modifiez les styles du texte du masque</a:t>
             </a:r>
           </a:p>
           <a:p>
             <a:pPr lvl="1"/>
             <a:r>
-              <a:rPr lang="fr-FR" smtClean="0"/>
+              <a:rPr lang="fr-FR"/>
               <a:t>Deuxième niveau</a:t>
             </a:r>
           </a:p>
           <a:p>
             <a:pPr lvl="2"/>
             <a:r>
-              <a:rPr lang="fr-FR" smtClean="0"/>
+              <a:rPr lang="fr-FR"/>
               <a:t>Troisième niveau</a:t>
             </a:r>
           </a:p>
           <a:p>
             <a:pPr lvl="3"/>
             <a:r>
-              <a:rPr lang="fr-FR" smtClean="0"/>
+              <a:rPr lang="fr-FR"/>
               <a:t>Quatrième niveau</a:t>
             </a:r>
           </a:p>
           <a:p>
             <a:pPr lvl="4"/>
             <a:r>
-              <a:rPr lang="fr-FR" smtClean="0"/>
+              <a:rPr lang="fr-FR"/>
               <a:t>Cinquième niveau</a:t>
             </a:r>
             <a:endParaRPr lang="en-US" dirty="0"/>
@@ -3830,7 +3762,7 @@
             <a:lstStyle/>
             <a:p>
               <a:r>
-                <a:rPr lang="en-US" sz="5400" dirty="0" smtClean="0">
+                <a:rPr lang="en-US" sz="5400" dirty="0">
                   <a:solidFill>
                     <a:schemeClr val="tx2">
                       <a:lumMod val="60000"/>
@@ -3841,15 +3773,6 @@
                 </a:rPr>
                 <a:t></a:t>
               </a:r>
-              <a:endParaRPr lang="en-US" sz="5400" dirty="0">
-                <a:solidFill>
-                  <a:schemeClr val="tx2">
-                    <a:lumMod val="60000"/>
-                    <a:lumOff val="40000"/>
-                  </a:schemeClr>
-                </a:solidFill>
-                <a:latin typeface="Wingdings" pitchFamily="2" charset="2"/>
-              </a:endParaRPr>
             </a:p>
           </p:txBody>
         </p:sp>
@@ -3973,7 +3896,7 @@
           <a:lstStyle/>
           <a:p>
             <a:r>
-              <a:rPr lang="fr-FR" smtClean="0"/>
+              <a:rPr lang="fr-FR"/>
               <a:t>Modifiez le style du titre</a:t>
             </a:r>
             <a:endParaRPr lang="en-US" dirty="0"/>
@@ -4082,7 +4005,7 @@
             <a:lstStyle/>
             <a:p>
               <a:r>
-                <a:rPr lang="en-US" sz="5400" dirty="0" smtClean="0">
+                <a:rPr lang="en-US" sz="5400" dirty="0">
                   <a:solidFill>
                     <a:schemeClr val="tx2">
                       <a:lumMod val="60000"/>
@@ -4093,15 +4016,6 @@
                 </a:rPr>
                 <a:t></a:t>
               </a:r>
-              <a:endParaRPr lang="en-US" sz="5400" dirty="0">
-                <a:solidFill>
-                  <a:schemeClr val="tx2">
-                    <a:lumMod val="60000"/>
-                    <a:lumOff val="40000"/>
-                  </a:schemeClr>
-                </a:solidFill>
-                <a:latin typeface="Wingdings" pitchFamily="2" charset="2"/>
-              </a:endParaRPr>
             </a:p>
           </p:txBody>
         </p:sp>
@@ -4324,7 +4238,7 @@
           </a:lstStyle>
           <a:p>
             <a:r>
-              <a:rPr lang="fr-FR" smtClean="0"/>
+              <a:rPr lang="fr-FR"/>
               <a:t>Modifiez le style du titre</a:t>
             </a:r>
             <a:endParaRPr lang="en-US"/>
@@ -4381,35 +4295,35 @@
           <a:p>
             <a:pPr lvl="0"/>
             <a:r>
-              <a:rPr lang="fr-FR" smtClean="0"/>
+              <a:rPr lang="fr-FR"/>
               <a:t>Modifiez les styles du texte du masque</a:t>
             </a:r>
           </a:p>
           <a:p>
             <a:pPr lvl="1"/>
             <a:r>
-              <a:rPr lang="fr-FR" smtClean="0"/>
+              <a:rPr lang="fr-FR"/>
               <a:t>Deuxième niveau</a:t>
             </a:r>
           </a:p>
           <a:p>
             <a:pPr lvl="2"/>
             <a:r>
-              <a:rPr lang="fr-FR" smtClean="0"/>
+              <a:rPr lang="fr-FR"/>
               <a:t>Troisième niveau</a:t>
             </a:r>
           </a:p>
           <a:p>
             <a:pPr lvl="3"/>
             <a:r>
-              <a:rPr lang="fr-FR" smtClean="0"/>
+              <a:rPr lang="fr-FR"/>
               <a:t>Quatrième niveau</a:t>
             </a:r>
           </a:p>
           <a:p>
             <a:pPr lvl="4"/>
             <a:r>
-              <a:rPr lang="fr-FR" smtClean="0"/>
+              <a:rPr lang="fr-FR"/>
               <a:t>Cinquième niveau</a:t>
             </a:r>
             <a:endParaRPr lang="en-US" dirty="0"/>
@@ -4477,7 +4391,7 @@
           <a:p>
             <a:pPr lvl="0"/>
             <a:r>
-              <a:rPr lang="fr-FR" smtClean="0"/>
+              <a:rPr lang="fr-FR"/>
               <a:t>Modifiez les styles du texte du masque</a:t>
             </a:r>
           </a:p>
@@ -4598,7 +4512,7 @@
           </a:lstStyle>
           <a:p>
             <a:r>
-              <a:rPr lang="fr-FR" smtClean="0"/>
+              <a:rPr lang="fr-FR"/>
               <a:t>Modifiez le style du titre</a:t>
             </a:r>
             <a:endParaRPr lang="en-US"/>
@@ -4695,7 +4609,7 @@
           </a:lstStyle>
           <a:p>
             <a:r>
-              <a:rPr lang="fr-FR" smtClean="0"/>
+              <a:rPr lang="fr-FR"/>
               <a:t>Cliquez sur l'icône pour ajouter une image</a:t>
             </a:r>
             <a:endParaRPr lang="en-US" dirty="0"/>
@@ -4763,7 +4677,7 @@
           <a:p>
             <a:pPr lvl="0"/>
             <a:r>
-              <a:rPr lang="fr-FR" smtClean="0"/>
+              <a:rPr lang="fr-FR"/>
               <a:t>Modifiez les styles du texte du masque</a:t>
             </a:r>
           </a:p>
@@ -4952,7 +4866,7 @@
           <a:lstStyle/>
           <a:p>
             <a:r>
-              <a:rPr lang="fr-FR" smtClean="0"/>
+              <a:rPr lang="fr-FR"/>
               <a:t>Modifiez le style du titre</a:t>
             </a:r>
             <a:endParaRPr lang="en-US" dirty="0"/>
@@ -4986,35 +4900,35 @@
           <a:p>
             <a:pPr lvl="0"/>
             <a:r>
-              <a:rPr lang="fr-FR" smtClean="0"/>
+              <a:rPr lang="fr-FR"/>
               <a:t>Modifiez les styles du texte du masque</a:t>
             </a:r>
           </a:p>
           <a:p>
             <a:pPr lvl="1"/>
             <a:r>
-              <a:rPr lang="fr-FR" smtClean="0"/>
+              <a:rPr lang="fr-FR"/>
               <a:t>Deuxième niveau</a:t>
             </a:r>
           </a:p>
           <a:p>
             <a:pPr lvl="2"/>
             <a:r>
-              <a:rPr lang="fr-FR" smtClean="0"/>
+              <a:rPr lang="fr-FR"/>
               <a:t>Troisième niveau</a:t>
             </a:r>
           </a:p>
           <a:p>
             <a:pPr lvl="3"/>
             <a:r>
-              <a:rPr lang="fr-FR" smtClean="0"/>
+              <a:rPr lang="fr-FR"/>
               <a:t>Quatrième niveau</a:t>
             </a:r>
           </a:p>
           <a:p>
             <a:pPr lvl="4"/>
             <a:r>
-              <a:rPr lang="fr-FR" smtClean="0"/>
+              <a:rPr lang="fr-FR"/>
               <a:t>Cinquième niveau</a:t>
             </a:r>
             <a:endParaRPr lang="en-US" dirty="0"/>
@@ -5541,7 +5455,7 @@
           <a:lstStyle/>
           <a:p>
             <a:r>
-              <a:rPr lang="fr-CH" dirty="0" err="1" smtClean="0"/>
+              <a:rPr lang="fr-CH" dirty="0" err="1"/>
               <a:t>Runner</a:t>
             </a:r>
             <a:endParaRPr lang="fr-CH" dirty="0"/>
@@ -5564,16 +5478,15 @@
           <a:lstStyle/>
           <a:p>
             <a:r>
-              <a:rPr lang="fr-CH" dirty="0" smtClean="0"/>
+              <a:rPr lang="fr-CH" dirty="0"/>
               <a:t>Présenté par Damien Gygi, Lancelot Magnin</a:t>
             </a:r>
           </a:p>
           <a:p>
             <a:r>
-              <a:rPr lang="fr-CH" dirty="0" smtClean="0"/>
+              <a:rPr lang="fr-CH" dirty="0"/>
               <a:t>Projet HES-ETE</a:t>
             </a:r>
-            <a:endParaRPr lang="fr-CH" dirty="0"/>
           </a:p>
         </p:txBody>
       </p:sp>
@@ -5630,13 +5543,6 @@
   <p:clrMapOvr>
     <a:masterClrMapping/>
   </p:clrMapOvr>
-  <p:timing>
-    <p:tnLst>
-      <p:par>
-        <p:cTn id="1" dur="indefinite" restart="never" nodeType="tmRoot"/>
-      </p:par>
-    </p:tnLst>
-  </p:timing>
 </p:sld>
 </file>
 
@@ -5673,10 +5579,9 @@
           <a:lstStyle/>
           <a:p>
             <a:r>
-              <a:rPr lang="fr-CH" dirty="0" smtClean="0"/>
+              <a:rPr lang="fr-CH" dirty="0"/>
               <a:t>Questions ?</a:t>
             </a:r>
-            <a:endParaRPr lang="fr-CH" dirty="0"/>
           </a:p>
         </p:txBody>
       </p:sp>
@@ -5719,13 +5624,6 @@
   <p:clrMapOvr>
     <a:masterClrMapping/>
   </p:clrMapOvr>
-  <p:timing>
-    <p:tnLst>
-      <p:par>
-        <p:cTn id="1" dur="indefinite" restart="never" nodeType="tmRoot"/>
-      </p:par>
-    </p:tnLst>
-  </p:timing>
 </p:sld>
 </file>
 
@@ -5761,7 +5659,7 @@
           <a:bodyPr/>
           <a:lstStyle/>
           <a:p>
-            <a:endParaRPr lang="fr-CH" dirty="0" smtClean="0"/>
+            <a:endParaRPr lang="fr-CH" dirty="0"/>
           </a:p>
           <a:p>
             <a:endParaRPr lang="fr-CH" dirty="0"/>
@@ -5784,10 +5682,9 @@
           <a:lstStyle/>
           <a:p>
             <a:r>
-              <a:rPr lang="fr-CH" dirty="0" smtClean="0"/>
+              <a:rPr lang="fr-CH" dirty="0"/>
               <a:t>Sommaire</a:t>
             </a:r>
-            <a:endParaRPr lang="fr-CH" dirty="0"/>
           </a:p>
         </p:txBody>
       </p:sp>
@@ -5801,13 +5698,6 @@
   <p:clrMapOvr>
     <a:masterClrMapping/>
   </p:clrMapOvr>
-  <p:timing>
-    <p:tnLst>
-      <p:par>
-        <p:cTn id="1" dur="indefinite" restart="never" nodeType="tmRoot"/>
-      </p:par>
-    </p:tnLst>
-  </p:timing>
 </p:sld>
 </file>
 
@@ -5844,17 +5734,17 @@
           <a:lstStyle/>
           <a:p>
             <a:r>
-              <a:rPr lang="fr-CH" dirty="0" err="1" smtClean="0"/>
+              <a:rPr lang="fr-CH" dirty="0" err="1"/>
               <a:t>Platformer</a:t>
             </a:r>
             <a:r>
-              <a:rPr lang="fr-CH" dirty="0" smtClean="0"/>
+              <a:rPr lang="fr-CH" dirty="0"/>
               <a:t> 2D</a:t>
             </a:r>
           </a:p>
           <a:p>
             <a:r>
-              <a:rPr lang="fr-CH" dirty="0" err="1" smtClean="0"/>
+              <a:rPr lang="fr-CH" dirty="0" err="1"/>
               <a:t>Libgdx</a:t>
             </a:r>
             <a:endParaRPr lang="fr-CH" dirty="0"/>
@@ -5877,13 +5767,42 @@
           <a:lstStyle/>
           <a:p>
             <a:r>
-              <a:rPr lang="fr-CH" dirty="0" smtClean="0"/>
+              <a:rPr lang="fr-CH" dirty="0"/>
               <a:t>Introduction</a:t>
             </a:r>
-            <a:endParaRPr lang="fr-CH" dirty="0"/>
-          </a:p>
-        </p:txBody>
-      </p:sp>
+          </a:p>
+        </p:txBody>
+      </p:sp>
+      <p:pic>
+        <p:nvPicPr>
+          <p:cNvPr id="4" name="Image 3"/>
+          <p:cNvPicPr>
+            <a:picLocks noChangeAspect="1"/>
+          </p:cNvPicPr>
+          <p:nvPr/>
+        </p:nvPicPr>
+        <p:blipFill>
+          <a:blip r:embed="rId3">
+            <a:extLst>
+              <a:ext uri="{28A0092B-C50C-407E-A947-70E740481C1C}">
+                <a14:useLocalDpi xmlns:a14="http://schemas.microsoft.com/office/drawing/2010/main" val="0"/>
+              </a:ext>
+            </a:extLst>
+          </a:blip>
+          <a:stretch>
+            <a:fillRect/>
+          </a:stretch>
+        </p:blipFill>
+        <p:spPr>
+          <a:xfrm>
+            <a:off x="3131840" y="2780928"/>
+            <a:ext cx="5674345" cy="3706628"/>
+          </a:xfrm>
+          <a:prstGeom prst="rect">
+            <a:avLst/>
+          </a:prstGeom>
+        </p:spPr>
+      </p:pic>
     </p:spTree>
     <p:extLst>
       <p:ext uri="{BB962C8B-B14F-4D97-AF65-F5344CB8AC3E}">
@@ -5894,13 +5813,6 @@
   <p:clrMapOvr>
     <a:masterClrMapping/>
   </p:clrMapOvr>
-  <p:timing>
-    <p:tnLst>
-      <p:par>
-        <p:cTn id="1" dur="indefinite" restart="never" nodeType="tmRoot"/>
-      </p:par>
-    </p:tnLst>
-  </p:timing>
 </p:sld>
 </file>
 
@@ -5937,10 +5849,9 @@
           <a:lstStyle/>
           <a:p>
             <a:r>
-              <a:rPr lang="fr-CH" dirty="0" smtClean="0"/>
+              <a:rPr lang="fr-CH" dirty="0"/>
               <a:t>Conception - animations</a:t>
             </a:r>
-            <a:endParaRPr lang="fr-CH" dirty="0"/>
           </a:p>
         </p:txBody>
       </p:sp>
@@ -6002,13 +5913,6 @@
   <p:clrMapOvr>
     <a:masterClrMapping/>
   </p:clrMapOvr>
-  <p:timing>
-    <p:tnLst>
-      <p:par>
-        <p:cTn id="1" dur="indefinite" restart="never" nodeType="tmRoot"/>
-      </p:par>
-    </p:tnLst>
-  </p:timing>
 </p:sld>
 </file>
 
@@ -6029,14 +5933,43 @@
           <a:chExt cx="0" cy="0"/>
         </a:xfrm>
       </p:grpSpPr>
-      <p:sp>
-        <p:nvSpPr>
-          <p:cNvPr id="2" name="Espace réservé du contenu 1"/>
-          <p:cNvSpPr>
-            <a:spLocks noGrp="1"/>
-          </p:cNvSpPr>
+      <p:pic>
+        <p:nvPicPr>
+          <p:cNvPr id="4" name="Espace réservé du contenu 3"/>
+          <p:cNvPicPr>
+            <a:picLocks noGrp="1" noChangeAspect="1"/>
+          </p:cNvPicPr>
           <p:nvPr>
             <p:ph idx="1"/>
+          </p:nvPr>
+        </p:nvPicPr>
+        <p:blipFill>
+          <a:blip r:embed="rId3">
+            <a:extLst>
+              <a:ext uri="{28A0092B-C50C-407E-A947-70E740481C1C}">
+                <a14:useLocalDpi xmlns:a14="http://schemas.microsoft.com/office/drawing/2010/main" val="0"/>
+              </a:ext>
+            </a:extLst>
+          </a:blip>
+          <a:stretch>
+            <a:fillRect/>
+          </a:stretch>
+        </p:blipFill>
+        <p:spPr>
+          <a:xfrm>
+            <a:off x="2226361" y="2420888"/>
+            <a:ext cx="4680519" cy="3716883"/>
+          </a:xfrm>
+        </p:spPr>
+      </p:pic>
+      <p:sp>
+        <p:nvSpPr>
+          <p:cNvPr id="3" name="Titre 2"/>
+          <p:cNvSpPr>
+            <a:spLocks noGrp="1"/>
+          </p:cNvSpPr>
+          <p:nvPr>
+            <p:ph type="title"/>
           </p:nvPr>
         </p:nvSpPr>
         <p:spPr/>
@@ -6044,30 +5977,10 @@
           <a:bodyPr/>
           <a:lstStyle/>
           <a:p>
-            <a:endParaRPr lang="fr-CH" dirty="0"/>
-          </a:p>
-        </p:txBody>
-      </p:sp>
-      <p:sp>
-        <p:nvSpPr>
-          <p:cNvPr id="3" name="Titre 2"/>
-          <p:cNvSpPr>
-            <a:spLocks noGrp="1"/>
-          </p:cNvSpPr>
-          <p:nvPr>
-            <p:ph type="title"/>
-          </p:nvPr>
-        </p:nvSpPr>
-        <p:spPr/>
-        <p:txBody>
-          <a:bodyPr/>
-          <a:lstStyle/>
-          <a:p>
-            <a:r>
-              <a:rPr lang="fr-CH" dirty="0" smtClean="0"/>
+            <a:r>
+              <a:rPr lang="fr-CH" dirty="0"/>
               <a:t>Conception-Architecture</a:t>
             </a:r>
-            <a:endParaRPr lang="fr-CH" dirty="0"/>
           </a:p>
         </p:txBody>
       </p:sp>
@@ -6117,7 +6030,7 @@
           <a:lstStyle/>
           <a:p>
             <a:r>
-              <a:rPr lang="fr-CH" dirty="0" smtClean="0"/>
+              <a:rPr lang="fr-CH" dirty="0"/>
               <a:t>Plusieurs formes</a:t>
             </a:r>
           </a:p>
@@ -6142,11 +6055,11 @@
           <a:lstStyle/>
           <a:p>
             <a:r>
-              <a:rPr lang="fr-CH" dirty="0" smtClean="0"/>
+              <a:rPr lang="fr-CH" dirty="0"/>
               <a:t>Conception - </a:t>
             </a:r>
             <a:r>
-              <a:rPr lang="fr-CH" dirty="0" err="1" smtClean="0"/>
+              <a:rPr lang="fr-CH" dirty="0" err="1"/>
               <a:t>hitBox</a:t>
             </a:r>
             <a:endParaRPr lang="fr-CH" dirty="0"/>
@@ -6175,7 +6088,7 @@
         </p:blipFill>
         <p:spPr>
           <a:xfrm>
-            <a:off x="3995936" y="1916832"/>
+            <a:off x="3851920" y="2420888"/>
             <a:ext cx="4050793" cy="4076190"/>
           </a:xfrm>
           <a:prstGeom prst="rect">
@@ -6253,10 +6166,9 @@
           <a:lstStyle/>
           <a:p>
             <a:r>
-              <a:rPr lang="fr-CH" dirty="0" smtClean="0"/>
+              <a:rPr lang="fr-CH" dirty="0"/>
               <a:t>Démonstration</a:t>
             </a:r>
-            <a:endParaRPr lang="fr-CH" dirty="0"/>
           </a:p>
         </p:txBody>
       </p:sp>
@@ -6270,13 +6182,6 @@
   <p:clrMapOvr>
     <a:masterClrMapping/>
   </p:clrMapOvr>
-  <p:timing>
-    <p:tnLst>
-      <p:par>
-        <p:cTn id="1" dur="indefinite" restart="never" nodeType="tmRoot"/>
-      </p:par>
-    </p:tnLst>
-  </p:timing>
 </p:sld>
 </file>
 
@@ -6313,10 +6218,9 @@
           <a:lstStyle/>
           <a:p>
             <a:r>
-              <a:rPr lang="fr-CH" dirty="0" smtClean="0"/>
+              <a:rPr lang="fr-CH" dirty="0"/>
               <a:t>Organisation</a:t>
             </a:r>
-            <a:endParaRPr lang="fr-CH" dirty="0"/>
           </a:p>
         </p:txBody>
       </p:sp>
@@ -6330,13 +6234,13 @@
             <p:ph idx="1"/>
             <p:extLst>
               <p:ext uri="{D42A27DB-BD31-4B8C-83A1-F6EECF244321}">
-                <p14:modId xmlns:p14="http://schemas.microsoft.com/office/powerpoint/2010/main" val="1954287725"/>
+                <p14:modId xmlns:p14="http://schemas.microsoft.com/office/powerpoint/2010/main" val="1278542011"/>
               </p:ext>
             </p:extLst>
           </p:nvPr>
         </p:nvGraphicFramePr>
         <p:xfrm>
-          <a:off x="698500" y="2247900"/>
+          <a:off x="688490" y="3356992"/>
           <a:ext cx="7746999" cy="1854200"/>
         </p:xfrm>
         <a:graphic>
@@ -6346,9 +6250,27 @@
                 <a:tableStyleId>{5C22544A-7EE6-4342-B048-85BDC9FD1C3A}</a:tableStyleId>
               </a:tblPr>
               <a:tblGrid>
-                <a:gridCol w="2582333"/>
-                <a:gridCol w="2731327"/>
-                <a:gridCol w="2433339"/>
+                <a:gridCol w="2582333">
+                  <a:extLst>
+                    <a:ext uri="{9D8B030D-6E8A-4147-A177-3AD203B41FA5}">
+                      <a16:colId xmlns:a16="http://schemas.microsoft.com/office/drawing/2014/main" val="20000"/>
+                    </a:ext>
+                  </a:extLst>
+                </a:gridCol>
+                <a:gridCol w="2731327">
+                  <a:extLst>
+                    <a:ext uri="{9D8B030D-6E8A-4147-A177-3AD203B41FA5}">
+                      <a16:colId xmlns:a16="http://schemas.microsoft.com/office/drawing/2014/main" val="20001"/>
+                    </a:ext>
+                  </a:extLst>
+                </a:gridCol>
+                <a:gridCol w="2433339">
+                  <a:extLst>
+                    <a:ext uri="{9D8B030D-6E8A-4147-A177-3AD203B41FA5}">
+                      <a16:colId xmlns:a16="http://schemas.microsoft.com/office/drawing/2014/main" val="20002"/>
+                    </a:ext>
+                  </a:extLst>
+                </a:gridCol>
               </a:tblGrid>
               <a:tr h="370840">
                 <a:tc>
@@ -6367,10 +6289,9 @@
                     <a:lstStyle/>
                     <a:p>
                       <a:r>
-                        <a:rPr lang="fr-CH" dirty="0" smtClean="0"/>
+                        <a:rPr lang="fr-CH" dirty="0"/>
                         <a:t>Damien</a:t>
                       </a:r>
-                      <a:endParaRPr lang="fr-CH" dirty="0"/>
                     </a:p>
                   </a:txBody>
                   <a:tcPr/>
@@ -6381,14 +6302,18 @@
                     <a:lstStyle/>
                     <a:p>
                       <a:r>
-                        <a:rPr lang="fr-CH" dirty="0" smtClean="0"/>
+                        <a:rPr lang="fr-CH" dirty="0"/>
                         <a:t>Lancelot</a:t>
                       </a:r>
-                      <a:endParaRPr lang="fr-CH" dirty="0"/>
                     </a:p>
                   </a:txBody>
                   <a:tcPr/>
                 </a:tc>
+                <a:extLst>
+                  <a:ext uri="{0D108BD9-81ED-4DB2-BD59-A6C34878D82A}">
+                    <a16:rowId xmlns:a16="http://schemas.microsoft.com/office/drawing/2014/main" val="10000"/>
+                  </a:ext>
+                </a:extLst>
               </a:tr>
               <a:tr h="370840">
                 <a:tc>
@@ -6397,14 +6322,13 @@
                     <a:lstStyle/>
                     <a:p>
                       <a:r>
-                        <a:rPr lang="fr-CH" dirty="0" err="1" smtClean="0"/>
+                        <a:rPr lang="fr-CH" dirty="0" err="1"/>
                         <a:t>Map</a:t>
                       </a:r>
                       <a:r>
-                        <a:rPr lang="fr-CH" dirty="0" smtClean="0"/>
+                        <a:rPr lang="fr-CH" dirty="0"/>
                         <a:t> </a:t>
                       </a:r>
-                      <a:endParaRPr lang="fr-CH" dirty="0"/>
                     </a:p>
                   </a:txBody>
                   <a:tcPr/>
@@ -6415,18 +6339,17 @@
                     <a:lstStyle/>
                     <a:p>
                       <a:r>
-                        <a:rPr lang="fr-CH" dirty="0" smtClean="0"/>
+                        <a:rPr lang="fr-CH" dirty="0"/>
                         <a:t>Intégration</a:t>
                       </a:r>
                       <a:r>
-                        <a:rPr lang="fr-CH" baseline="0" dirty="0" smtClean="0"/>
+                        <a:rPr lang="fr-CH" baseline="0" dirty="0"/>
                         <a:t> </a:t>
                       </a:r>
                       <a:r>
-                        <a:rPr lang="fr-CH" dirty="0" smtClean="0"/>
+                        <a:rPr lang="fr-CH" dirty="0"/>
                         <a:t>d’un niveau</a:t>
                       </a:r>
-                      <a:endParaRPr lang="fr-CH" dirty="0"/>
                     </a:p>
                   </a:txBody>
                   <a:tcPr/>
@@ -6437,14 +6360,18 @@
                     <a:lstStyle/>
                     <a:p>
                       <a:r>
-                        <a:rPr lang="fr-CH" dirty="0" smtClean="0"/>
+                        <a:rPr lang="fr-CH" dirty="0"/>
                         <a:t>Collisions</a:t>
                       </a:r>
-                      <a:endParaRPr lang="fr-CH" dirty="0"/>
                     </a:p>
                   </a:txBody>
                   <a:tcPr/>
                 </a:tc>
+                <a:extLst>
+                  <a:ext uri="{0D108BD9-81ED-4DB2-BD59-A6C34878D82A}">
+                    <a16:rowId xmlns:a16="http://schemas.microsoft.com/office/drawing/2014/main" val="10001"/>
+                  </a:ext>
+                </a:extLst>
               </a:tr>
               <a:tr h="370840">
                 <a:tc>
@@ -6453,10 +6380,9 @@
                     <a:lstStyle/>
                     <a:p>
                       <a:r>
-                        <a:rPr lang="fr-CH" dirty="0" smtClean="0"/>
+                        <a:rPr lang="fr-CH" dirty="0"/>
                         <a:t>Joueur</a:t>
                       </a:r>
-                      <a:endParaRPr lang="fr-CH" dirty="0"/>
                     </a:p>
                   </a:txBody>
                   <a:tcPr/>
@@ -6467,10 +6393,9 @@
                     <a:lstStyle/>
                     <a:p>
                       <a:r>
-                        <a:rPr lang="fr-CH" dirty="0" smtClean="0"/>
+                        <a:rPr lang="fr-CH" dirty="0"/>
                         <a:t>Caméra</a:t>
                       </a:r>
-                      <a:endParaRPr lang="fr-CH" dirty="0"/>
                     </a:p>
                   </a:txBody>
                   <a:tcPr/>
@@ -6481,14 +6406,18 @@
                     <a:lstStyle/>
                     <a:p>
                       <a:r>
-                        <a:rPr lang="fr-CH" dirty="0" smtClean="0"/>
+                        <a:rPr lang="fr-CH" dirty="0"/>
                         <a:t>Déplacements</a:t>
                       </a:r>
-                      <a:endParaRPr lang="fr-CH" dirty="0"/>
                     </a:p>
                   </a:txBody>
                   <a:tcPr/>
                 </a:tc>
+                <a:extLst>
+                  <a:ext uri="{0D108BD9-81ED-4DB2-BD59-A6C34878D82A}">
+                    <a16:rowId xmlns:a16="http://schemas.microsoft.com/office/drawing/2014/main" val="10002"/>
+                  </a:ext>
+                </a:extLst>
               </a:tr>
               <a:tr h="370840">
                 <a:tc>
@@ -6497,10 +6426,9 @@
                     <a:lstStyle/>
                     <a:p>
                       <a:r>
-                        <a:rPr lang="fr-CH" dirty="0" smtClean="0"/>
+                        <a:rPr lang="fr-CH" dirty="0"/>
                         <a:t>Interface</a:t>
                       </a:r>
-                      <a:endParaRPr lang="fr-CH" dirty="0"/>
                     </a:p>
                   </a:txBody>
                   <a:tcPr/>
@@ -6511,10 +6439,9 @@
                     <a:lstStyle/>
                     <a:p>
                       <a:r>
-                        <a:rPr lang="fr-CH" dirty="0" smtClean="0"/>
+                        <a:rPr lang="fr-CH" dirty="0"/>
                         <a:t>HUD et niveaux</a:t>
                       </a:r>
-                      <a:endParaRPr lang="fr-CH" dirty="0"/>
                     </a:p>
                   </a:txBody>
                   <a:tcPr/>
@@ -6525,7 +6452,7 @@
                     <a:lstStyle/>
                     <a:p>
                       <a:r>
-                        <a:rPr lang="fr-CH" dirty="0" err="1" smtClean="0"/>
+                        <a:rPr lang="fr-CH" dirty="0" err="1"/>
                         <a:t>BackGround</a:t>
                       </a:r>
                       <a:endParaRPr lang="fr-CH" dirty="0"/>
@@ -6533,6 +6460,11 @@
                   </a:txBody>
                   <a:tcPr/>
                 </a:tc>
+                <a:extLst>
+                  <a:ext uri="{0D108BD9-81ED-4DB2-BD59-A6C34878D82A}">
+                    <a16:rowId xmlns:a16="http://schemas.microsoft.com/office/drawing/2014/main" val="10003"/>
+                  </a:ext>
+                </a:extLst>
               </a:tr>
               <a:tr h="370840">
                 <a:tc>
@@ -6560,11 +6492,16 @@
                     <a:bodyPr/>
                     <a:lstStyle/>
                     <a:p>
-                      <a:endParaRPr lang="fr-CH"/>
+                      <a:endParaRPr lang="fr-CH" dirty="0"/>
                     </a:p>
                   </a:txBody>
                   <a:tcPr/>
                 </a:tc>
+                <a:extLst>
+                  <a:ext uri="{0D108BD9-81ED-4DB2-BD59-A6C34878D82A}">
+                    <a16:rowId xmlns:a16="http://schemas.microsoft.com/office/drawing/2014/main" val="10004"/>
+                  </a:ext>
+                </a:extLst>
               </a:tr>
             </a:tbl>
           </a:graphicData>
@@ -6616,28 +6553,27 @@
           <a:lstStyle/>
           <a:p>
             <a:r>
-              <a:rPr lang="fr-CH" dirty="0" smtClean="0"/>
+              <a:rPr lang="fr-CH" dirty="0"/>
               <a:t>Menu pour choisir des niveaux</a:t>
             </a:r>
           </a:p>
           <a:p>
             <a:r>
-              <a:rPr lang="fr-CH" dirty="0" smtClean="0"/>
+              <a:rPr lang="fr-CH" dirty="0"/>
               <a:t>Objets bonus et déplaçables</a:t>
             </a:r>
           </a:p>
           <a:p>
             <a:r>
-              <a:rPr lang="fr-CH" dirty="0" smtClean="0"/>
+              <a:rPr lang="fr-CH" dirty="0"/>
               <a:t>Contenu sonore</a:t>
             </a:r>
           </a:p>
           <a:p>
             <a:r>
-              <a:rPr lang="fr-CH" dirty="0" smtClean="0"/>
+              <a:rPr lang="fr-CH" dirty="0"/>
               <a:t>Niveaux plus complexes (énigmes) </a:t>
             </a:r>
-            <a:endParaRPr lang="fr-CH" dirty="0"/>
           </a:p>
         </p:txBody>
       </p:sp>
@@ -6657,10 +6593,9 @@
           <a:lstStyle/>
           <a:p>
             <a:r>
-              <a:rPr lang="fr-CH" dirty="0" smtClean="0"/>
+              <a:rPr lang="fr-CH" dirty="0"/>
               <a:t>Améliorations possibles</a:t>
             </a:r>
-            <a:endParaRPr lang="fr-CH" dirty="0"/>
           </a:p>
         </p:txBody>
       </p:sp>
@@ -6674,13 +6609,6 @@
   <p:clrMapOvr>
     <a:masterClrMapping/>
   </p:clrMapOvr>
-  <p:timing>
-    <p:tnLst>
-      <p:par>
-        <p:cTn id="1" dur="indefinite" restart="never" nodeType="tmRoot"/>
-      </p:par>
-    </p:tnLst>
-  </p:timing>
 </p:sld>
 </file>
 

</xml_diff>

<commit_message>
MAJ de la présentation
</commit_message>
<xml_diff>
--- a/Admimistatif/Presentation.pptx
+++ b/Admimistatif/Presentation.pptx
@@ -5,7 +5,7 @@
     <p:sldMasterId id="2147483660" r:id="rId1"/>
   </p:sldMasterIdLst>
   <p:notesMasterIdLst>
-    <p:notesMasterId r:id="rId12"/>
+    <p:notesMasterId r:id="rId13"/>
   </p:notesMasterIdLst>
   <p:sldIdLst>
     <p:sldId id="256" r:id="rId2"/>
@@ -13,11 +13,12 @@
     <p:sldId id="266" r:id="rId4"/>
     <p:sldId id="267" r:id="rId5"/>
     <p:sldId id="268" r:id="rId6"/>
-    <p:sldId id="269" r:id="rId7"/>
-    <p:sldId id="264" r:id="rId8"/>
-    <p:sldId id="265" r:id="rId9"/>
-    <p:sldId id="262" r:id="rId10"/>
-    <p:sldId id="263" r:id="rId11"/>
+    <p:sldId id="270" r:id="rId7"/>
+    <p:sldId id="269" r:id="rId8"/>
+    <p:sldId id="264" r:id="rId9"/>
+    <p:sldId id="265" r:id="rId10"/>
+    <p:sldId id="262" r:id="rId11"/>
+    <p:sldId id="263" r:id="rId12"/>
   </p:sldIdLst>
   <p:sldSz cx="9144000" cy="6858000" type="screen4x3"/>
   <p:notesSz cx="6858000" cy="9144000"/>
@@ -217,7 +218,7 @@
           <a:p>
             <a:fld id="{CC6C08FC-58E4-420C-A4FD-6358B9EB482C}" type="datetimeFigureOut">
               <a:rPr lang="fr-CH" smtClean="0"/>
-              <a:t>08.09.2016</a:t>
+              <a:t>09.09.2016</a:t>
             </a:fld>
             <a:endParaRPr lang="fr-CH"/>
           </a:p>
@@ -818,52 +819,6 @@
           <a:bodyPr/>
           <a:lstStyle/>
           <a:p>
-            <a:r>
-              <a:rPr lang="fr-CH" dirty="0"/>
-              <a:t> </a:t>
-            </a:r>
-            <a:r>
-              <a:rPr lang="fr-CH" dirty="0" err="1"/>
-              <a:t>gameStage</a:t>
-            </a:r>
-            <a:r>
-              <a:rPr lang="fr-CH" dirty="0"/>
-              <a:t> (</a:t>
-            </a:r>
-            <a:r>
-              <a:rPr lang="fr-CH" dirty="0" err="1"/>
-              <a:t>scene</a:t>
-            </a:r>
-            <a:r>
-              <a:rPr lang="fr-CH" dirty="0"/>
-              <a:t>)</a:t>
-            </a:r>
-            <a:r>
-              <a:rPr lang="fr-CH" baseline="0" dirty="0"/>
-              <a:t> contient les </a:t>
-            </a:r>
-            <a:r>
-              <a:rPr lang="fr-CH" baseline="0" dirty="0" err="1"/>
-              <a:t>elements</a:t>
-            </a:r>
-            <a:r>
-              <a:rPr lang="fr-CH" baseline="0" dirty="0"/>
-              <a:t> de jeu.</a:t>
-            </a:r>
-          </a:p>
-          <a:p>
-            <a:r>
-              <a:rPr lang="fr-CH" baseline="0" dirty="0"/>
-              <a:t>Deux boucles, une pour les calculs (position </a:t>
-            </a:r>
-            <a:r>
-              <a:rPr lang="fr-CH" baseline="0" dirty="0" err="1"/>
-              <a:t>etc</a:t>
-            </a:r>
-            <a:r>
-              <a:rPr lang="fr-CH" baseline="0" dirty="0"/>
-              <a:t>) et une pour le rendu (graphique…)</a:t>
-            </a:r>
             <a:endParaRPr lang="fr-CH" dirty="0"/>
           </a:p>
         </p:txBody>
@@ -987,7 +942,7 @@
           <a:p>
             <a:fld id="{1723C952-8087-44AE-BD64-9C59D2DE6B24}" type="slidenum">
               <a:rPr lang="fr-CH" smtClean="0"/>
-              <a:t>6</a:t>
+              <a:t>7</a:t>
             </a:fld>
             <a:endParaRPr lang="fr-CH"/>
           </a:p>
@@ -1071,7 +1026,7 @@
           <a:p>
             <a:fld id="{1723C952-8087-44AE-BD64-9C59D2DE6B24}" type="slidenum">
               <a:rPr lang="fr-CH" smtClean="0"/>
-              <a:t>7</a:t>
+              <a:t>8</a:t>
             </a:fld>
             <a:endParaRPr lang="fr-CH"/>
           </a:p>
@@ -1155,7 +1110,7 @@
           <a:p>
             <a:fld id="{1723C952-8087-44AE-BD64-9C59D2DE6B24}" type="slidenum">
               <a:rPr lang="fr-CH" smtClean="0"/>
-              <a:t>9</a:t>
+              <a:t>10</a:t>
             </a:fld>
             <a:endParaRPr lang="fr-CH"/>
           </a:p>
@@ -1245,7 +1200,7 @@
           <a:p>
             <a:fld id="{49D6A521-9AD2-4B66-A862-FAA159BAE7C0}" type="datetimeFigureOut">
               <a:rPr lang="fr-CH" smtClean="0"/>
-              <a:t>08.09.2016</a:t>
+              <a:t>09.09.2016</a:t>
             </a:fld>
             <a:endParaRPr lang="fr-CH"/>
           </a:p>
@@ -1748,7 +1703,7 @@
           <a:p>
             <a:fld id="{49D6A521-9AD2-4B66-A862-FAA159BAE7C0}" type="datetimeFigureOut">
               <a:rPr lang="fr-CH" smtClean="0"/>
-              <a:t>08.09.2016</a:t>
+              <a:t>09.09.2016</a:t>
             </a:fld>
             <a:endParaRPr lang="fr-CH"/>
           </a:p>
@@ -2053,7 +2008,7 @@
           <a:p>
             <a:fld id="{49D6A521-9AD2-4B66-A862-FAA159BAE7C0}" type="datetimeFigureOut">
               <a:rPr lang="fr-CH" smtClean="0"/>
-              <a:t>08.09.2016</a:t>
+              <a:t>09.09.2016</a:t>
             </a:fld>
             <a:endParaRPr lang="fr-CH"/>
           </a:p>
@@ -2330,7 +2285,7 @@
           <a:p>
             <a:fld id="{49D6A521-9AD2-4B66-A862-FAA159BAE7C0}" type="datetimeFigureOut">
               <a:rPr lang="fr-CH" smtClean="0"/>
-              <a:t>08.09.2016</a:t>
+              <a:t>09.09.2016</a:t>
             </a:fld>
             <a:endParaRPr lang="fr-CH"/>
           </a:p>
@@ -2887,7 +2842,7 @@
           <a:p>
             <a:fld id="{49D6A521-9AD2-4B66-A862-FAA159BAE7C0}" type="datetimeFigureOut">
               <a:rPr lang="fr-CH" smtClean="0"/>
-              <a:t>08.09.2016</a:t>
+              <a:t>09.09.2016</a:t>
             </a:fld>
             <a:endParaRPr lang="fr-CH"/>
           </a:p>
@@ -2977,7 +2932,7 @@
           <a:p>
             <a:fld id="{49D6A521-9AD2-4B66-A862-FAA159BAE7C0}" type="datetimeFigureOut">
               <a:rPr lang="fr-CH" smtClean="0"/>
-              <a:t>08.09.2016</a:t>
+              <a:t>09.09.2016</a:t>
             </a:fld>
             <a:endParaRPr lang="fr-CH"/>
           </a:p>
@@ -3677,7 +3632,7 @@
           <a:p>
             <a:fld id="{49D6A521-9AD2-4B66-A862-FAA159BAE7C0}" type="datetimeFigureOut">
               <a:rPr lang="fr-CH" smtClean="0"/>
-              <a:t>08.09.2016</a:t>
+              <a:t>09.09.2016</a:t>
             </a:fld>
             <a:endParaRPr lang="fr-CH"/>
           </a:p>
@@ -3920,7 +3875,7 @@
           <a:p>
             <a:fld id="{49D6A521-9AD2-4B66-A862-FAA159BAE7C0}" type="datetimeFigureOut">
               <a:rPr lang="fr-CH" smtClean="0"/>
-              <a:t>08.09.2016</a:t>
+              <a:t>09.09.2016</a:t>
             </a:fld>
             <a:endParaRPr lang="fr-CH"/>
           </a:p>
@@ -4140,7 +4095,7 @@
           <a:p>
             <a:fld id="{49D6A521-9AD2-4B66-A862-FAA159BAE7C0}" type="datetimeFigureOut">
               <a:rPr lang="fr-CH" smtClean="0"/>
-              <a:t>08.09.2016</a:t>
+              <a:t>09.09.2016</a:t>
             </a:fld>
             <a:endParaRPr lang="fr-CH"/>
           </a:p>
@@ -4414,7 +4369,7 @@
           <a:p>
             <a:fld id="{49D6A521-9AD2-4B66-A862-FAA159BAE7C0}" type="datetimeFigureOut">
               <a:rPr lang="fr-CH" smtClean="0"/>
-              <a:t>08.09.2016</a:t>
+              <a:t>09.09.2016</a:t>
             </a:fld>
             <a:endParaRPr lang="fr-CH"/>
           </a:p>
@@ -4700,7 +4655,7 @@
           <a:p>
             <a:fld id="{49D6A521-9AD2-4B66-A862-FAA159BAE7C0}" type="datetimeFigureOut">
               <a:rPr lang="fr-CH" smtClean="0"/>
-              <a:t>08.09.2016</a:t>
+              <a:t>09.09.2016</a:t>
             </a:fld>
             <a:endParaRPr lang="fr-CH"/>
           </a:p>
@@ -4968,7 +4923,7 @@
           <a:p>
             <a:fld id="{49D6A521-9AD2-4B66-A862-FAA159BAE7C0}" type="datetimeFigureOut">
               <a:rPr lang="fr-CH" smtClean="0"/>
-              <a:t>08.09.2016</a:t>
+              <a:t>09.09.2016</a:t>
             </a:fld>
             <a:endParaRPr lang="fr-CH"/>
           </a:p>
@@ -5565,6 +5520,105 @@
       </p:grpSpPr>
       <p:sp>
         <p:nvSpPr>
+          <p:cNvPr id="2" name="Espace réservé du contenu 1"/>
+          <p:cNvSpPr>
+            <a:spLocks noGrp="1"/>
+          </p:cNvSpPr>
+          <p:nvPr>
+            <p:ph idx="1"/>
+          </p:nvPr>
+        </p:nvSpPr>
+        <p:spPr/>
+        <p:txBody>
+          <a:bodyPr/>
+          <a:lstStyle/>
+          <a:p>
+            <a:r>
+              <a:rPr lang="fr-CH" dirty="0"/>
+              <a:t>Menu pour choisir des niveaux</a:t>
+            </a:r>
+          </a:p>
+          <a:p>
+            <a:r>
+              <a:rPr lang="fr-CH" dirty="0"/>
+              <a:t>Objets bonus et déplaçables</a:t>
+            </a:r>
+          </a:p>
+          <a:p>
+            <a:r>
+              <a:rPr lang="fr-CH" dirty="0"/>
+              <a:t>Contenu sonore</a:t>
+            </a:r>
+          </a:p>
+          <a:p>
+            <a:r>
+              <a:rPr lang="fr-CH" dirty="0"/>
+              <a:t>Niveaux plus complexes (énigmes) </a:t>
+            </a:r>
+          </a:p>
+        </p:txBody>
+      </p:sp>
+      <p:sp>
+        <p:nvSpPr>
+          <p:cNvPr id="3" name="Titre 2"/>
+          <p:cNvSpPr>
+            <a:spLocks noGrp="1"/>
+          </p:cNvSpPr>
+          <p:nvPr>
+            <p:ph type="title"/>
+          </p:nvPr>
+        </p:nvSpPr>
+        <p:spPr/>
+        <p:txBody>
+          <a:bodyPr/>
+          <a:lstStyle/>
+          <a:p>
+            <a:r>
+              <a:rPr lang="fr-CH" dirty="0"/>
+              <a:t>Améliorations possibles</a:t>
+            </a:r>
+          </a:p>
+        </p:txBody>
+      </p:sp>
+    </p:spTree>
+    <p:extLst>
+      <p:ext uri="{BB962C8B-B14F-4D97-AF65-F5344CB8AC3E}">
+        <p14:creationId xmlns:p14="http://schemas.microsoft.com/office/powerpoint/2010/main" val="2639256084"/>
+      </p:ext>
+    </p:extLst>
+  </p:cSld>
+  <p:clrMapOvr>
+    <a:masterClrMapping/>
+  </p:clrMapOvr>
+  <p:timing>
+    <p:tnLst>
+      <p:par>
+        <p:cTn id="1" dur="indefinite" restart="never" nodeType="tmRoot"/>
+      </p:par>
+    </p:tnLst>
+  </p:timing>
+</p:sld>
+</file>
+
+<file path=ppt/slides/slide11.xml><?xml version="1.0" encoding="utf-8"?>
+<p:sld xmlns:a="http://schemas.openxmlformats.org/drawingml/2006/main" xmlns:r="http://schemas.openxmlformats.org/officeDocument/2006/relationships" xmlns:p="http://schemas.openxmlformats.org/presentationml/2006/main">
+  <p:cSld>
+    <p:spTree>
+      <p:nvGrpSpPr>
+        <p:cNvPr id="1" name=""/>
+        <p:cNvGrpSpPr/>
+        <p:nvPr/>
+      </p:nvGrpSpPr>
+      <p:grpSpPr>
+        <a:xfrm>
+          <a:off x="0" y="0"/>
+          <a:ext cx="0" cy="0"/>
+          <a:chOff x="0" y="0"/>
+          <a:chExt cx="0" cy="0"/>
+        </a:xfrm>
+      </p:grpSpPr>
+      <p:sp>
+        <p:nvSpPr>
           <p:cNvPr id="3" name="Titre 2"/>
           <p:cNvSpPr>
             <a:spLocks noGrp="1"/>
@@ -5609,7 +5663,7 @@
         </p:blipFill>
         <p:spPr>
           <a:xfrm>
-            <a:off x="3774710" y="2247900"/>
+            <a:off x="3769331" y="3861048"/>
             <a:ext cx="1594579" cy="3878263"/>
           </a:xfrm>
         </p:spPr>
@@ -5624,6 +5678,79 @@
   <p:clrMapOvr>
     <a:masterClrMapping/>
   </p:clrMapOvr>
+  <p:timing>
+    <p:tnLst>
+      <p:par>
+        <p:cTn id="1" dur="indefinite" restart="never" nodeType="tmRoot">
+          <p:childTnLst>
+            <p:seq concurrent="1" nextAc="seek">
+              <p:cTn id="2" dur="indefinite" nodeType="mainSeq">
+                <p:childTnLst>
+                  <p:par>
+                    <p:cTn id="3" fill="hold">
+                      <p:stCondLst>
+                        <p:cond delay="indefinite"/>
+                        <p:cond evt="onBegin" delay="0">
+                          <p:tn val="2"/>
+                        </p:cond>
+                      </p:stCondLst>
+                      <p:childTnLst>
+                        <p:par>
+                          <p:cTn id="4" fill="hold">
+                            <p:stCondLst>
+                              <p:cond delay="0"/>
+                            </p:stCondLst>
+                            <p:childTnLst>
+                              <p:par>
+                                <p:cTn id="5" presetID="42" presetClass="path" presetSubtype="0" accel="50000" decel="50000" fill="hold" nodeType="withEffect">
+                                  <p:stCondLst>
+                                    <p:cond delay="0"/>
+                                  </p:stCondLst>
+                                  <p:childTnLst>
+                                    <p:animMotion origin="layout" path="M 0.00017 0.12755 L 0.00017 -0.23009 " pathEditMode="relative" rAng="0" ptsTypes="AA">
+                                      <p:cBhvr>
+                                        <p:cTn id="6" dur="2000" fill="hold"/>
+                                        <p:tgtEl>
+                                          <p:spTgt spid="6"/>
+                                        </p:tgtEl>
+                                        <p:attrNameLst>
+                                          <p:attrName>ppt_x</p:attrName>
+                                          <p:attrName>ppt_y</p:attrName>
+                                        </p:attrNameLst>
+                                      </p:cBhvr>
+                                      <p:rCtr x="0" y="-17894"/>
+                                    </p:animMotion>
+                                  </p:childTnLst>
+                                </p:cTn>
+                              </p:par>
+                            </p:childTnLst>
+                          </p:cTn>
+                        </p:par>
+                      </p:childTnLst>
+                    </p:cTn>
+                  </p:par>
+                </p:childTnLst>
+              </p:cTn>
+              <p:prevCondLst>
+                <p:cond evt="onPrev" delay="0">
+                  <p:tgtEl>
+                    <p:sldTgt/>
+                  </p:tgtEl>
+                </p:cond>
+              </p:prevCondLst>
+              <p:nextCondLst>
+                <p:cond evt="onNext" delay="0">
+                  <p:tgtEl>
+                    <p:sldTgt/>
+                  </p:tgtEl>
+                </p:cond>
+              </p:nextCondLst>
+            </p:seq>
+          </p:childTnLst>
+        </p:cTn>
+      </p:par>
+    </p:tnLst>
+  </p:timing>
 </p:sld>
 </file>
 
@@ -5656,12 +5783,77 @@
         </p:nvSpPr>
         <p:spPr/>
         <p:txBody>
-          <a:bodyPr/>
+          <a:bodyPr>
+            <a:normAutofit lnSpcReduction="10000"/>
+          </a:bodyPr>
           <a:lstStyle/>
           <a:p>
             <a:endParaRPr lang="fr-CH" dirty="0"/>
           </a:p>
           <a:p>
+            <a:r>
+              <a:rPr lang="fr-CH" dirty="0" smtClean="0"/>
+              <a:t>Introduction</a:t>
+            </a:r>
+          </a:p>
+          <a:p>
+            <a:r>
+              <a:rPr lang="fr-CH" dirty="0" smtClean="0"/>
+              <a:t>Conception</a:t>
+            </a:r>
+          </a:p>
+          <a:p>
+            <a:pPr lvl="1"/>
+            <a:r>
+              <a:rPr lang="fr-CH" dirty="0" smtClean="0"/>
+              <a:t>Animations</a:t>
+            </a:r>
+          </a:p>
+          <a:p>
+            <a:pPr lvl="1"/>
+            <a:r>
+              <a:rPr lang="fr-CH" dirty="0" err="1" smtClean="0"/>
+              <a:t>Map</a:t>
+            </a:r>
+            <a:endParaRPr lang="fr-CH" dirty="0" smtClean="0"/>
+          </a:p>
+          <a:p>
+            <a:pPr lvl="1"/>
+            <a:r>
+              <a:rPr lang="fr-CH" dirty="0" err="1" smtClean="0"/>
+              <a:t>SpriteSheet</a:t>
+            </a:r>
+            <a:endParaRPr lang="fr-CH" dirty="0" smtClean="0"/>
+          </a:p>
+          <a:p>
+            <a:pPr lvl="1"/>
+            <a:r>
+              <a:rPr lang="fr-CH" dirty="0" err="1" smtClean="0"/>
+              <a:t>Hitbox</a:t>
+            </a:r>
+            <a:endParaRPr lang="fr-CH" dirty="0" smtClean="0"/>
+          </a:p>
+          <a:p>
+            <a:pPr lvl="1"/>
+            <a:r>
+              <a:rPr lang="fr-CH" dirty="0" smtClean="0"/>
+              <a:t>Démo</a:t>
+            </a:r>
+          </a:p>
+          <a:p>
+            <a:r>
+              <a:rPr lang="fr-CH" dirty="0" smtClean="0"/>
+              <a:t>Organisation</a:t>
+            </a:r>
+          </a:p>
+          <a:p>
+            <a:r>
+              <a:rPr lang="fr-CH" dirty="0" smtClean="0"/>
+              <a:t>Améliorations possibles</a:t>
+            </a:r>
+          </a:p>
+          <a:p>
+            <a:pPr lvl="1"/>
             <a:endParaRPr lang="fr-CH" dirty="0"/>
           </a:p>
         </p:txBody>
@@ -5698,6 +5890,13 @@
   <p:clrMapOvr>
     <a:masterClrMapping/>
   </p:clrMapOvr>
+  <p:timing>
+    <p:tnLst>
+      <p:par>
+        <p:cTn id="1" dur="indefinite" restart="never" nodeType="tmRoot"/>
+      </p:par>
+    </p:tnLst>
+  </p:timing>
 </p:sld>
 </file>
 
@@ -5813,6 +6012,13 @@
   <p:clrMapOvr>
     <a:masterClrMapping/>
   </p:clrMapOvr>
+  <p:timing>
+    <p:tnLst>
+      <p:par>
+        <p:cTn id="1" dur="indefinite" restart="never" nodeType="tmRoot"/>
+      </p:par>
+    </p:tnLst>
+  </p:timing>
 </p:sld>
 </file>
 
@@ -5849,9 +6055,10 @@
           <a:lstStyle/>
           <a:p>
             <a:r>
-              <a:rPr lang="fr-CH" dirty="0"/>
-              <a:t>Conception - animations</a:t>
-            </a:r>
+              <a:rPr lang="fr-CH" dirty="0" smtClean="0"/>
+              <a:t>Animations</a:t>
+            </a:r>
+            <a:endParaRPr lang="fr-CH" dirty="0"/>
           </a:p>
         </p:txBody>
       </p:sp>
@@ -5913,6 +6120,13 @@
   <p:clrMapOvr>
     <a:masterClrMapping/>
   </p:clrMapOvr>
+  <p:timing>
+    <p:tnLst>
+      <p:par>
+        <p:cTn id="1" dur="indefinite" restart="never" nodeType="tmRoot"/>
+      </p:par>
+    </p:tnLst>
+  </p:timing>
 </p:sld>
 </file>
 
@@ -5933,57 +6147,76 @@
           <a:chExt cx="0" cy="0"/>
         </a:xfrm>
       </p:grpSpPr>
+      <p:sp>
+        <p:nvSpPr>
+          <p:cNvPr id="3" name="Titre 2"/>
+          <p:cNvSpPr>
+            <a:spLocks noGrp="1"/>
+          </p:cNvSpPr>
+          <p:nvPr>
+            <p:ph type="title"/>
+          </p:nvPr>
+        </p:nvSpPr>
+        <p:spPr/>
+        <p:txBody>
+          <a:bodyPr/>
+          <a:lstStyle/>
+          <a:p>
+            <a:r>
+              <a:rPr lang="fr-CH" dirty="0" err="1" smtClean="0"/>
+              <a:t>Map</a:t>
+            </a:r>
+            <a:endParaRPr lang="fr-CH" dirty="0"/>
+          </a:p>
+        </p:txBody>
+      </p:sp>
+      <p:sp>
+        <p:nvSpPr>
+          <p:cNvPr id="2" name="Espace réservé du contenu 1"/>
+          <p:cNvSpPr>
+            <a:spLocks noGrp="1"/>
+          </p:cNvSpPr>
+          <p:nvPr>
+            <p:ph idx="1"/>
+          </p:nvPr>
+        </p:nvSpPr>
+        <p:spPr/>
+        <p:txBody>
+          <a:bodyPr/>
+          <a:lstStyle/>
+          <a:p>
+            <a:r>
+              <a:rPr lang="fr-CH" dirty="0" err="1" smtClean="0"/>
+              <a:t>Tiled</a:t>
+            </a:r>
+            <a:endParaRPr lang="fr-CH" dirty="0"/>
+          </a:p>
+        </p:txBody>
+      </p:sp>
       <p:pic>
         <p:nvPicPr>
-          <p:cNvPr id="4" name="Espace réservé du contenu 3"/>
+          <p:cNvPr id="5" name="Image 4"/>
           <p:cNvPicPr>
-            <a:picLocks noGrp="1" noChangeAspect="1"/>
+            <a:picLocks noChangeAspect="1"/>
           </p:cNvPicPr>
-          <p:nvPr>
-            <p:ph idx="1"/>
-          </p:nvPr>
+          <p:nvPr/>
         </p:nvPicPr>
         <p:blipFill>
-          <a:blip r:embed="rId3">
-            <a:extLst>
-              <a:ext uri="{28A0092B-C50C-407E-A947-70E740481C1C}">
-                <a14:useLocalDpi xmlns:a14="http://schemas.microsoft.com/office/drawing/2010/main" val="0"/>
-              </a:ext>
-            </a:extLst>
-          </a:blip>
+          <a:blip r:embed="rId3"/>
           <a:stretch>
             <a:fillRect/>
           </a:stretch>
         </p:blipFill>
         <p:spPr>
           <a:xfrm>
-            <a:off x="2226361" y="2420888"/>
-            <a:ext cx="4680519" cy="3716883"/>
+            <a:off x="2037733" y="2924944"/>
+            <a:ext cx="5057775" cy="2857500"/>
           </a:xfrm>
+          <a:prstGeom prst="rect">
+            <a:avLst/>
+          </a:prstGeom>
         </p:spPr>
       </p:pic>
-      <p:sp>
-        <p:nvSpPr>
-          <p:cNvPr id="3" name="Titre 2"/>
-          <p:cNvSpPr>
-            <a:spLocks noGrp="1"/>
-          </p:cNvSpPr>
-          <p:nvPr>
-            <p:ph type="title"/>
-          </p:nvPr>
-        </p:nvSpPr>
-        <p:spPr/>
-        <p:txBody>
-          <a:bodyPr/>
-          <a:lstStyle/>
-          <a:p>
-            <a:r>
-              <a:rPr lang="fr-CH" dirty="0"/>
-              <a:t>Conception-Architecture</a:t>
-            </a:r>
-          </a:p>
-        </p:txBody>
-      </p:sp>
     </p:spTree>
     <p:extLst>
       <p:ext uri="{BB962C8B-B14F-4D97-AF65-F5344CB8AC3E}">
@@ -5994,6 +6227,13 @@
   <p:clrMapOvr>
     <a:masterClrMapping/>
   </p:clrMapOvr>
+  <p:timing>
+    <p:tnLst>
+      <p:par>
+        <p:cTn id="1" dur="indefinite" restart="never" nodeType="tmRoot"/>
+      </p:par>
+    </p:tnLst>
+  </p:timing>
 </p:sld>
 </file>
 
@@ -6016,12 +6256,12 @@
       </p:grpSpPr>
       <p:sp>
         <p:nvSpPr>
-          <p:cNvPr id="2" name="Espace réservé du contenu 1"/>
-          <p:cNvSpPr>
-            <a:spLocks noGrp="1"/>
-          </p:cNvSpPr>
-          <p:nvPr>
-            <p:ph idx="1"/>
+          <p:cNvPr id="3" name="Titre 2"/>
+          <p:cNvSpPr>
+            <a:spLocks noGrp="1"/>
+          </p:cNvSpPr>
+          <p:nvPr>
+            <p:ph type="title"/>
           </p:nvPr>
         </p:nvSpPr>
         <p:spPr/>
@@ -6030,6 +6270,146 @@
           <a:lstStyle/>
           <a:p>
             <a:r>
+              <a:rPr lang="fr-CH" dirty="0" err="1" smtClean="0"/>
+              <a:t>Sprite</a:t>
+            </a:r>
+            <a:r>
+              <a:rPr lang="fr-CH" dirty="0" smtClean="0"/>
+              <a:t> </a:t>
+            </a:r>
+            <a:r>
+              <a:rPr lang="fr-CH" dirty="0" err="1" smtClean="0"/>
+              <a:t>Sheet</a:t>
+            </a:r>
+            <a:endParaRPr lang="fr-CH" dirty="0"/>
+          </a:p>
+        </p:txBody>
+      </p:sp>
+      <p:pic>
+        <p:nvPicPr>
+          <p:cNvPr id="4" name="Espace réservé du contenu 3"/>
+          <p:cNvPicPr>
+            <a:picLocks noGrp="1" noChangeAspect="1"/>
+          </p:cNvPicPr>
+          <p:nvPr>
+            <p:ph sz="quarter" idx="13"/>
+          </p:nvPr>
+        </p:nvPicPr>
+        <p:blipFill rotWithShape="1">
+          <a:blip r:embed="rId2" cstate="print">
+            <a:extLst>
+              <a:ext uri="{28A0092B-C50C-407E-A947-70E740481C1C}">
+                <a14:useLocalDpi xmlns:a14="http://schemas.microsoft.com/office/drawing/2010/main" val="0"/>
+              </a:ext>
+            </a:extLst>
+          </a:blip>
+          <a:stretch/>
+        </p:blipFill>
+        <p:spPr>
+          <a:xfrm>
+            <a:off x="2051720" y="3284984"/>
+            <a:ext cx="5256584" cy="5256584"/>
+          </a:xfrm>
+        </p:spPr>
+      </p:pic>
+      <p:sp>
+        <p:nvSpPr>
+          <p:cNvPr id="5" name="Espace réservé du contenu 4"/>
+          <p:cNvSpPr>
+            <a:spLocks noGrp="1"/>
+          </p:cNvSpPr>
+          <p:nvPr>
+            <p:ph sz="quarter" idx="14"/>
+          </p:nvPr>
+        </p:nvSpPr>
+        <p:spPr>
+          <a:xfrm>
+            <a:off x="827584" y="2204864"/>
+            <a:ext cx="7483910" cy="936104"/>
+          </a:xfrm>
+        </p:spPr>
+        <p:txBody>
+          <a:bodyPr>
+            <a:normAutofit/>
+          </a:bodyPr>
+          <a:lstStyle/>
+          <a:p>
+            <a:r>
+              <a:rPr lang="fr-CH" dirty="0" smtClean="0"/>
+              <a:t>Regroupement de </a:t>
+            </a:r>
+            <a:r>
+              <a:rPr lang="fr-CH" dirty="0" err="1" smtClean="0"/>
+              <a:t>sprites</a:t>
+            </a:r>
+            <a:endParaRPr lang="fr-CH" dirty="0" smtClean="0"/>
+          </a:p>
+          <a:p>
+            <a:r>
+              <a:rPr lang="fr-CH" dirty="0" smtClean="0"/>
+              <a:t>Fichier de données </a:t>
+            </a:r>
+            <a:r>
+              <a:rPr lang="fr-CH" dirty="0" err="1" smtClean="0"/>
+              <a:t>Json</a:t>
+            </a:r>
+            <a:endParaRPr lang="fr-CH" dirty="0"/>
+          </a:p>
+        </p:txBody>
+      </p:sp>
+    </p:spTree>
+    <p:extLst>
+      <p:ext uri="{BB962C8B-B14F-4D97-AF65-F5344CB8AC3E}">
+        <p14:creationId xmlns:p14="http://schemas.microsoft.com/office/powerpoint/2010/main" val="2093814381"/>
+      </p:ext>
+    </p:extLst>
+  </p:cSld>
+  <p:clrMapOvr>
+    <a:masterClrMapping/>
+  </p:clrMapOvr>
+  <p:timing>
+    <p:tnLst>
+      <p:par>
+        <p:cTn id="1" dur="indefinite" restart="never" nodeType="tmRoot"/>
+      </p:par>
+    </p:tnLst>
+  </p:timing>
+</p:sld>
+</file>
+
+<file path=ppt/slides/slide7.xml><?xml version="1.0" encoding="utf-8"?>
+<p:sld xmlns:a="http://schemas.openxmlformats.org/drawingml/2006/main" xmlns:r="http://schemas.openxmlformats.org/officeDocument/2006/relationships" xmlns:p="http://schemas.openxmlformats.org/presentationml/2006/main">
+  <p:cSld>
+    <p:spTree>
+      <p:nvGrpSpPr>
+        <p:cNvPr id="1" name=""/>
+        <p:cNvGrpSpPr/>
+        <p:nvPr/>
+      </p:nvGrpSpPr>
+      <p:grpSpPr>
+        <a:xfrm>
+          <a:off x="0" y="0"/>
+          <a:ext cx="0" cy="0"/>
+          <a:chOff x="0" y="0"/>
+          <a:chExt cx="0" cy="0"/>
+        </a:xfrm>
+      </p:grpSpPr>
+      <p:sp>
+        <p:nvSpPr>
+          <p:cNvPr id="2" name="Espace réservé du contenu 1"/>
+          <p:cNvSpPr>
+            <a:spLocks noGrp="1"/>
+          </p:cNvSpPr>
+          <p:nvPr>
+            <p:ph idx="1"/>
+          </p:nvPr>
+        </p:nvSpPr>
+        <p:spPr/>
+        <p:txBody>
+          <a:bodyPr/>
+          <a:lstStyle/>
+          <a:p>
+            <a:r>
               <a:rPr lang="fr-CH" dirty="0"/>
               <a:t>Plusieurs formes</a:t>
             </a:r>
@@ -6055,12 +6435,12 @@
           <a:lstStyle/>
           <a:p>
             <a:r>
-              <a:rPr lang="fr-CH" dirty="0"/>
-              <a:t>Conception - </a:t>
-            </a:r>
-            <a:r>
               <a:rPr lang="fr-CH" dirty="0" err="1"/>
-              <a:t>hitBox</a:t>
+              <a:t>H</a:t>
+            </a:r>
+            <a:r>
+              <a:rPr lang="fr-CH" dirty="0" err="1" smtClean="0"/>
+              <a:t>itBox</a:t>
             </a:r>
             <a:endParaRPr lang="fr-CH" dirty="0"/>
           </a:p>
@@ -6106,82 +6486,13 @@
   <p:clrMapOvr>
     <a:masterClrMapping/>
   </p:clrMapOvr>
-</p:sld>
-</file>
-
-<file path=ppt/slides/slide7.xml><?xml version="1.0" encoding="utf-8"?>
-<p:sld xmlns:a="http://schemas.openxmlformats.org/drawingml/2006/main" xmlns:r="http://schemas.openxmlformats.org/officeDocument/2006/relationships" xmlns:p="http://schemas.openxmlformats.org/presentationml/2006/main">
-  <p:cSld>
-    <p:spTree>
-      <p:nvGrpSpPr>
-        <p:cNvPr id="1" name=""/>
-        <p:cNvGrpSpPr/>
-        <p:nvPr/>
-      </p:nvGrpSpPr>
-      <p:grpSpPr>
-        <a:xfrm>
-          <a:off x="0" y="0"/>
-          <a:ext cx="0" cy="0"/>
-          <a:chOff x="0" y="0"/>
-          <a:chExt cx="0" cy="0"/>
-        </a:xfrm>
-      </p:grpSpPr>
-      <p:sp>
-        <p:nvSpPr>
-          <p:cNvPr id="2" name="Espace réservé du contenu 1"/>
-          <p:cNvSpPr>
-            <a:spLocks noGrp="1"/>
-          </p:cNvSpPr>
-          <p:nvPr>
-            <p:ph idx="1"/>
-          </p:nvPr>
-        </p:nvSpPr>
-        <p:spPr>
-          <a:xfrm>
-            <a:off x="688490" y="1916832"/>
-            <a:ext cx="7745505" cy="3877815"/>
-          </a:xfrm>
-        </p:spPr>
-        <p:txBody>
-          <a:bodyPr/>
-          <a:lstStyle/>
-          <a:p>
-            <a:endParaRPr lang="fr-CH" dirty="0"/>
-          </a:p>
-        </p:txBody>
-      </p:sp>
-      <p:sp>
-        <p:nvSpPr>
-          <p:cNvPr id="3" name="Titre 2"/>
-          <p:cNvSpPr>
-            <a:spLocks noGrp="1"/>
-          </p:cNvSpPr>
-          <p:nvPr>
-            <p:ph type="title"/>
-          </p:nvPr>
-        </p:nvSpPr>
-        <p:spPr/>
-        <p:txBody>
-          <a:bodyPr/>
-          <a:lstStyle/>
-          <a:p>
-            <a:r>
-              <a:rPr lang="fr-CH" dirty="0"/>
-              <a:t>Démonstration</a:t>
-            </a:r>
-          </a:p>
-        </p:txBody>
-      </p:sp>
-    </p:spTree>
-    <p:extLst>
-      <p:ext uri="{BB962C8B-B14F-4D97-AF65-F5344CB8AC3E}">
-        <p14:creationId xmlns:p14="http://schemas.microsoft.com/office/powerpoint/2010/main" val="2776342878"/>
-      </p:ext>
-    </p:extLst>
-  </p:cSld>
-  <p:clrMapOvr>
-    <a:masterClrMapping/>
-  </p:clrMapOvr>
+  <p:timing>
+    <p:tnLst>
+      <p:par>
+        <p:cTn id="1" dur="indefinite" restart="never" nodeType="tmRoot"/>
+      </p:par>
+    </p:tnLst>
+  </p:timing>
 </p:sld>
 </file>
 
@@ -6204,6 +6515,89 @@
       </p:grpSpPr>
       <p:sp>
         <p:nvSpPr>
+          <p:cNvPr id="2" name="Espace réservé du contenu 1"/>
+          <p:cNvSpPr>
+            <a:spLocks noGrp="1"/>
+          </p:cNvSpPr>
+          <p:nvPr>
+            <p:ph idx="1"/>
+          </p:nvPr>
+        </p:nvSpPr>
+        <p:spPr>
+          <a:xfrm>
+            <a:off x="688490" y="1916832"/>
+            <a:ext cx="7745505" cy="3877815"/>
+          </a:xfrm>
+        </p:spPr>
+        <p:txBody>
+          <a:bodyPr/>
+          <a:lstStyle/>
+          <a:p>
+            <a:endParaRPr lang="fr-CH" dirty="0"/>
+          </a:p>
+        </p:txBody>
+      </p:sp>
+      <p:sp>
+        <p:nvSpPr>
+          <p:cNvPr id="3" name="Titre 2"/>
+          <p:cNvSpPr>
+            <a:spLocks noGrp="1"/>
+          </p:cNvSpPr>
+          <p:nvPr>
+            <p:ph type="title"/>
+          </p:nvPr>
+        </p:nvSpPr>
+        <p:spPr/>
+        <p:txBody>
+          <a:bodyPr/>
+          <a:lstStyle/>
+          <a:p>
+            <a:r>
+              <a:rPr lang="fr-CH" dirty="0"/>
+              <a:t>Démonstration</a:t>
+            </a:r>
+          </a:p>
+        </p:txBody>
+      </p:sp>
+    </p:spTree>
+    <p:extLst>
+      <p:ext uri="{BB962C8B-B14F-4D97-AF65-F5344CB8AC3E}">
+        <p14:creationId xmlns:p14="http://schemas.microsoft.com/office/powerpoint/2010/main" val="2776342878"/>
+      </p:ext>
+    </p:extLst>
+  </p:cSld>
+  <p:clrMapOvr>
+    <a:masterClrMapping/>
+  </p:clrMapOvr>
+  <p:timing>
+    <p:tnLst>
+      <p:par>
+        <p:cTn id="1" dur="indefinite" restart="never" nodeType="tmRoot"/>
+      </p:par>
+    </p:tnLst>
+  </p:timing>
+</p:sld>
+</file>
+
+<file path=ppt/slides/slide9.xml><?xml version="1.0" encoding="utf-8"?>
+<p:sld xmlns:a="http://schemas.openxmlformats.org/drawingml/2006/main" xmlns:r="http://schemas.openxmlformats.org/officeDocument/2006/relationships" xmlns:p="http://schemas.openxmlformats.org/presentationml/2006/main">
+  <p:cSld>
+    <p:spTree>
+      <p:nvGrpSpPr>
+        <p:cNvPr id="1" name=""/>
+        <p:cNvGrpSpPr/>
+        <p:nvPr/>
+      </p:nvGrpSpPr>
+      <p:grpSpPr>
+        <a:xfrm>
+          <a:off x="0" y="0"/>
+          <a:ext cx="0" cy="0"/>
+          <a:chOff x="0" y="0"/>
+          <a:chExt cx="0" cy="0"/>
+        </a:xfrm>
+      </p:grpSpPr>
+      <p:sp>
+        <p:nvSpPr>
           <p:cNvPr id="3" name="Titre 2"/>
           <p:cNvSpPr>
             <a:spLocks noGrp="1"/>
@@ -6234,14 +6628,14 @@
             <p:ph idx="1"/>
             <p:extLst>
               <p:ext uri="{D42A27DB-BD31-4B8C-83A1-F6EECF244321}">
-                <p14:modId xmlns:p14="http://schemas.microsoft.com/office/powerpoint/2010/main" val="1278542011"/>
+                <p14:modId xmlns:p14="http://schemas.microsoft.com/office/powerpoint/2010/main" val="2284329607"/>
               </p:ext>
             </p:extLst>
           </p:nvPr>
         </p:nvGraphicFramePr>
         <p:xfrm>
-          <a:off x="688490" y="3356992"/>
-          <a:ext cx="7746999" cy="1854200"/>
+          <a:off x="697754" y="3284984"/>
+          <a:ext cx="7746999" cy="1849120"/>
         </p:xfrm>
         <a:graphic>
           <a:graphicData uri="http://schemas.openxmlformats.org/drawingml/2006/table">
@@ -6253,26 +6647,26 @@
                 <a:gridCol w="2582333">
                   <a:extLst>
                     <a:ext uri="{9D8B030D-6E8A-4147-A177-3AD203B41FA5}">
-                      <a16:colId xmlns:a16="http://schemas.microsoft.com/office/drawing/2014/main" val="20000"/>
+                      <a16:colId xmlns:a16="http://schemas.microsoft.com/office/drawing/2014/main" xmlns="" val="20000"/>
                     </a:ext>
                   </a:extLst>
                 </a:gridCol>
                 <a:gridCol w="2731327">
                   <a:extLst>
                     <a:ext uri="{9D8B030D-6E8A-4147-A177-3AD203B41FA5}">
-                      <a16:colId xmlns:a16="http://schemas.microsoft.com/office/drawing/2014/main" val="20001"/>
+                      <a16:colId xmlns:a16="http://schemas.microsoft.com/office/drawing/2014/main" xmlns="" val="20001"/>
                     </a:ext>
                   </a:extLst>
                 </a:gridCol>
                 <a:gridCol w="2433339">
                   <a:extLst>
                     <a:ext uri="{9D8B030D-6E8A-4147-A177-3AD203B41FA5}">
-                      <a16:colId xmlns:a16="http://schemas.microsoft.com/office/drawing/2014/main" val="20002"/>
+                      <a16:colId xmlns:a16="http://schemas.microsoft.com/office/drawing/2014/main" xmlns="" val="20002"/>
                     </a:ext>
                   </a:extLst>
                 </a:gridCol>
               </a:tblGrid>
-              <a:tr h="370840">
+              <a:tr h="298832">
                 <a:tc>
                   <a:txBody>
                     <a:bodyPr/>
@@ -6311,7 +6705,7 @@
                 </a:tc>
                 <a:extLst>
                   <a:ext uri="{0D108BD9-81ED-4DB2-BD59-A6C34878D82A}">
-                    <a16:rowId xmlns:a16="http://schemas.microsoft.com/office/drawing/2014/main" val="10000"/>
+                    <a16:rowId xmlns:a16="http://schemas.microsoft.com/office/drawing/2014/main" xmlns="" val="10000"/>
                   </a:ext>
                 </a:extLst>
               </a:tr>
@@ -6369,7 +6763,7 @@
                 </a:tc>
                 <a:extLst>
                   <a:ext uri="{0D108BD9-81ED-4DB2-BD59-A6C34878D82A}">
-                    <a16:rowId xmlns:a16="http://schemas.microsoft.com/office/drawing/2014/main" val="10001"/>
+                    <a16:rowId xmlns:a16="http://schemas.microsoft.com/office/drawing/2014/main" xmlns="" val="10001"/>
                   </a:ext>
                 </a:extLst>
               </a:tr>
@@ -6415,7 +6809,7 @@
                 </a:tc>
                 <a:extLst>
                   <a:ext uri="{0D108BD9-81ED-4DB2-BD59-A6C34878D82A}">
-                    <a16:rowId xmlns:a16="http://schemas.microsoft.com/office/drawing/2014/main" val="10002"/>
+                    <a16:rowId xmlns:a16="http://schemas.microsoft.com/office/drawing/2014/main" xmlns="" val="10002"/>
                   </a:ext>
                 </a:extLst>
               </a:tr>
@@ -6462,7 +6856,7 @@
                 </a:tc>
                 <a:extLst>
                   <a:ext uri="{0D108BD9-81ED-4DB2-BD59-A6C34878D82A}">
-                    <a16:rowId xmlns:a16="http://schemas.microsoft.com/office/drawing/2014/main" val="10003"/>
+                    <a16:rowId xmlns:a16="http://schemas.microsoft.com/office/drawing/2014/main" xmlns="" val="10003"/>
                   </a:ext>
                 </a:extLst>
               </a:tr>
@@ -6472,7 +6866,7 @@
                     <a:bodyPr/>
                     <a:lstStyle/>
                     <a:p>
-                      <a:endParaRPr lang="fr-CH"/>
+                      <a:endParaRPr lang="fr-CH" dirty="0"/>
                     </a:p>
                   </a:txBody>
                   <a:tcPr/>
@@ -6499,7 +6893,7 @@
                 </a:tc>
                 <a:extLst>
                   <a:ext uri="{0D108BD9-81ED-4DB2-BD59-A6C34878D82A}">
-                    <a16:rowId xmlns:a16="http://schemas.microsoft.com/office/drawing/2014/main" val="10004"/>
+                    <a16:rowId xmlns:a16="http://schemas.microsoft.com/office/drawing/2014/main" xmlns="" val="10004"/>
                   </a:ext>
                 </a:extLst>
               </a:tr>
@@ -6517,98 +6911,13 @@
   <p:clrMapOvr>
     <a:masterClrMapping/>
   </p:clrMapOvr>
-</p:sld>
-</file>
-
-<file path=ppt/slides/slide9.xml><?xml version="1.0" encoding="utf-8"?>
-<p:sld xmlns:a="http://schemas.openxmlformats.org/drawingml/2006/main" xmlns:r="http://schemas.openxmlformats.org/officeDocument/2006/relationships" xmlns:p="http://schemas.openxmlformats.org/presentationml/2006/main">
-  <p:cSld>
-    <p:spTree>
-      <p:nvGrpSpPr>
-        <p:cNvPr id="1" name=""/>
-        <p:cNvGrpSpPr/>
-        <p:nvPr/>
-      </p:nvGrpSpPr>
-      <p:grpSpPr>
-        <a:xfrm>
-          <a:off x="0" y="0"/>
-          <a:ext cx="0" cy="0"/>
-          <a:chOff x="0" y="0"/>
-          <a:chExt cx="0" cy="0"/>
-        </a:xfrm>
-      </p:grpSpPr>
-      <p:sp>
-        <p:nvSpPr>
-          <p:cNvPr id="2" name="Espace réservé du contenu 1"/>
-          <p:cNvSpPr>
-            <a:spLocks noGrp="1"/>
-          </p:cNvSpPr>
-          <p:nvPr>
-            <p:ph idx="1"/>
-          </p:nvPr>
-        </p:nvSpPr>
-        <p:spPr/>
-        <p:txBody>
-          <a:bodyPr/>
-          <a:lstStyle/>
-          <a:p>
-            <a:r>
-              <a:rPr lang="fr-CH" dirty="0"/>
-              <a:t>Menu pour choisir des niveaux</a:t>
-            </a:r>
-          </a:p>
-          <a:p>
-            <a:r>
-              <a:rPr lang="fr-CH" dirty="0"/>
-              <a:t>Objets bonus et déplaçables</a:t>
-            </a:r>
-          </a:p>
-          <a:p>
-            <a:r>
-              <a:rPr lang="fr-CH" dirty="0"/>
-              <a:t>Contenu sonore</a:t>
-            </a:r>
-          </a:p>
-          <a:p>
-            <a:r>
-              <a:rPr lang="fr-CH" dirty="0"/>
-              <a:t>Niveaux plus complexes (énigmes) </a:t>
-            </a:r>
-          </a:p>
-        </p:txBody>
-      </p:sp>
-      <p:sp>
-        <p:nvSpPr>
-          <p:cNvPr id="3" name="Titre 2"/>
-          <p:cNvSpPr>
-            <a:spLocks noGrp="1"/>
-          </p:cNvSpPr>
-          <p:nvPr>
-            <p:ph type="title"/>
-          </p:nvPr>
-        </p:nvSpPr>
-        <p:spPr/>
-        <p:txBody>
-          <a:bodyPr/>
-          <a:lstStyle/>
-          <a:p>
-            <a:r>
-              <a:rPr lang="fr-CH" dirty="0"/>
-              <a:t>Améliorations possibles</a:t>
-            </a:r>
-          </a:p>
-        </p:txBody>
-      </p:sp>
-    </p:spTree>
-    <p:extLst>
-      <p:ext uri="{BB962C8B-B14F-4D97-AF65-F5344CB8AC3E}">
-        <p14:creationId xmlns:p14="http://schemas.microsoft.com/office/powerpoint/2010/main" val="2639256084"/>
-      </p:ext>
-    </p:extLst>
-  </p:cSld>
-  <p:clrMapOvr>
-    <a:masterClrMapping/>
-  </p:clrMapOvr>
+  <p:timing>
+    <p:tnLst>
+      <p:par>
+        <p:cTn id="1" dur="indefinite" restart="never" nodeType="tmRoot"/>
+      </p:par>
+    </p:tnLst>
+  </p:timing>
 </p:sld>
 </file>
 

</xml_diff>